<commit_message>
re #712: Improved calibration phantom descriptions (added images of phantoms, updated tutorial)
git-svn-id: https://subversion.assembla.com/svn/plus/trunk/doc@2634 c04e96f8-ac36-4ff2-8b34-4a5e34ef045f
</commit_message>
<xml_diff>
--- a/tutorials/PlusTutorialBuildingfCalPhantom.pptx
+++ b/tutorials/PlusTutorialBuildingfCalPhantom.pptx
@@ -5,15 +5,16 @@
     <p:sldMasterId id="2147483648" r:id="rId1"/>
   </p:sldMasterIdLst>
   <p:notesMasterIdLst>
-    <p:notesMasterId r:id="rId8"/>
+    <p:notesMasterId r:id="rId9"/>
   </p:notesMasterIdLst>
   <p:sldIdLst>
     <p:sldId id="256" r:id="rId2"/>
     <p:sldId id="262" r:id="rId3"/>
     <p:sldId id="263" r:id="rId4"/>
-    <p:sldId id="264" r:id="rId5"/>
-    <p:sldId id="259" r:id="rId6"/>
-    <p:sldId id="265" r:id="rId7"/>
+    <p:sldId id="266" r:id="rId5"/>
+    <p:sldId id="264" r:id="rId6"/>
+    <p:sldId id="259" r:id="rId7"/>
+    <p:sldId id="265" r:id="rId8"/>
   </p:sldIdLst>
   <p:sldSz cx="9144000" cy="6858000" type="screen4x3"/>
   <p:notesSz cx="6858000" cy="9144000"/>
@@ -198,7 +199,7 @@
             <a:fld id="{08AE2C8F-80C9-49EC-8D3E-1E16295FA588}" type="datetimeFigureOut">
               <a:rPr lang="en-US" smtClean="0"/>
               <a:pPr/>
-              <a:t>11/3/2012</a:t>
+              <a:t>4/1/2013</a:t>
             </a:fld>
             <a:endParaRPr lang="en-US"/>
           </a:p>
@@ -3674,11 +3675,7 @@
             <a:pPr lvl="1"/>
             <a:r>
               <a:rPr lang="en-CA" dirty="0" smtClean="0"/>
-              <a:t>Printable </a:t>
-            </a:r>
-            <a:r>
-              <a:rPr lang="en-CA" dirty="0" smtClean="0"/>
-              <a:t>STL files: </a:t>
+              <a:t>Printable STL files: </a:t>
             </a:r>
             <a:r>
               <a:rPr lang="en-CA" dirty="0">
@@ -3896,23 +3893,40 @@
           <a:p>
             <a:r>
               <a:rPr lang="en-CA" sz="1400" dirty="0" smtClean="0"/>
-              <a:t>The endpoints of the fiducial lines shall correspond to the description in the device set configuration XML file, such as:</a:t>
-            </a:r>
-            <a:br>
+              <a:t>The endpoints of the fiducial lines shall correspond to the description in the device set configuration XML file, such </a:t>
+            </a:r>
+            <a:r>
               <a:rPr lang="en-CA" sz="1400" dirty="0" smtClean="0"/>
-            </a:br>
-            <a:r>
-              <a:rPr lang="en-CA" sz="1000" dirty="0" smtClean="0">
+              <a:t>as: </a:t>
+            </a:r>
+            <a:r>
+              <a:rPr lang="en-CA" sz="900" dirty="0" smtClean="0">
                 <a:hlinkClick r:id="rId2"/>
               </a:rPr>
-              <a:t>https://www.assembla.com/code/plus/subversion/nodes/trunk/PlusLib/data/ConfigFiles/PlusConfiguration_SonixTouch_Ascension3DG_L14_fCal1.xml</a:t>
-            </a:r>
-            <a:endParaRPr lang="en-CA" sz="1000" dirty="0" smtClean="0"/>
+              <a:t>https</a:t>
+            </a:r>
+            <a:r>
+              <a:rPr lang="en-CA" sz="900" dirty="0">
+                <a:hlinkClick r:id="rId2"/>
+              </a:rPr>
+              <a:t>://</a:t>
+            </a:r>
+            <a:r>
+              <a:rPr lang="en-CA" sz="900" dirty="0" smtClean="0">
+                <a:hlinkClick r:id="rId2"/>
+              </a:rPr>
+              <a:t>subversion.assembla.com/svn/plus/trunk/PlusLib/data/ConfigFiles/PlusConfiguration_SonixTouch_Ascension3DG_L14_fCal2.0.xml</a:t>
+            </a:r>
+            <a:endParaRPr lang="en-CA" sz="1400" dirty="0"/>
           </a:p>
           <a:p>
             <a:r>
               <a:rPr lang="en-CA" sz="1400" dirty="0" smtClean="0"/>
-              <a:t>The automatic calibration method in </a:t>
+              <a:t>The </a:t>
+            </a:r>
+            <a:r>
+              <a:rPr lang="en-CA" sz="1400" dirty="0" smtClean="0"/>
+              <a:t>automatic calibration method in </a:t>
             </a:r>
             <a:r>
               <a:rPr lang="en-CA" sz="1400" dirty="0" err="1" smtClean="0"/>
@@ -3920,7 +3934,19 @@
             </a:r>
             <a:r>
               <a:rPr lang="en-CA" sz="1400" dirty="0" smtClean="0"/>
-              <a:t> supports a fiducial line structure containing two parallel N patterns.</a:t>
+              <a:t> supports a fiducial line structure containing </a:t>
+            </a:r>
+            <a:r>
+              <a:rPr lang="en-CA" sz="1400" dirty="0" smtClean="0"/>
+              <a:t>any number of </a:t>
+            </a:r>
+            <a:r>
+              <a:rPr lang="en-CA" sz="1400" dirty="0" smtClean="0"/>
+              <a:t>parallel </a:t>
+            </a:r>
+            <a:r>
+              <a:rPr lang="en-CA" sz="1400" dirty="0" smtClean="0"/>
+              <a:t>N patterns.</a:t>
             </a:r>
           </a:p>
         </p:txBody>
@@ -4214,7 +4240,7 @@
         </p:nvSpPr>
         <p:spPr>
           <a:xfrm>
-            <a:off x="457200" y="2895600"/>
+            <a:off x="457200" y="2514600"/>
             <a:ext cx="5562600" cy="2362200"/>
           </a:xfrm>
           <a:prstGeom prst="rect">
@@ -4245,7 +4271,7 @@
               <a:defRPr/>
             </a:pPr>
             <a:r>
-              <a:rPr kumimoji="0" lang="en-US" sz="1400" b="0" i="0" u="none" strike="noStrike" kern="1200" cap="none" spc="0" normalizeH="0" baseline="0" noProof="0" dirty="0" smtClean="0">
+              <a:rPr kumimoji="0" lang="en-US" sz="1100" b="1" i="0" u="none" strike="noStrike" kern="1200" cap="none" spc="0" normalizeH="0" baseline="0" noProof="0" dirty="0" smtClean="0">
                 <a:ln>
                   <a:noFill/>
                 </a:ln>
@@ -4255,12 +4281,668 @@
                 <a:effectLst/>
                 <a:uLnTx/>
                 <a:uFillTx/>
-                <a:latin typeface="+mn-lt"/>
-                <a:ea typeface="+mn-ea"/>
-                <a:cs typeface="+mn-cs"/>
-              </a:rPr>
-              <a:t>Phantom mode: fCal_1.0, Wiring: wiring_1.0:</a:t>
-            </a:r>
+                <a:latin typeface="Courier New" pitchFamily="49" charset="0"/>
+                <a:cs typeface="Courier New" pitchFamily="49" charset="0"/>
+              </a:rPr>
+              <a:t>Phantom mode: </a:t>
+            </a:r>
+            <a:r>
+              <a:rPr kumimoji="0" lang="en-US" sz="1100" b="1" i="0" u="none" strike="noStrike" kern="1200" cap="none" spc="0" normalizeH="0" baseline="0" noProof="0" dirty="0" smtClean="0">
+                <a:ln>
+                  <a:noFill/>
+                </a:ln>
+                <a:solidFill>
+                  <a:schemeClr val="tx1"/>
+                </a:solidFill>
+                <a:effectLst/>
+                <a:uLnTx/>
+                <a:uFillTx/>
+                <a:latin typeface="Courier New" pitchFamily="49" charset="0"/>
+                <a:cs typeface="Courier New" pitchFamily="49" charset="0"/>
+              </a:rPr>
+              <a:t>fCal_2.0</a:t>
+            </a:r>
+            <a:r>
+              <a:rPr kumimoji="0" lang="en-US" sz="1100" b="1" i="0" u="none" strike="noStrike" kern="1200" cap="none" spc="0" normalizeH="0" baseline="0" noProof="0" dirty="0" smtClean="0">
+                <a:ln>
+                  <a:noFill/>
+                </a:ln>
+                <a:solidFill>
+                  <a:schemeClr val="tx1"/>
+                </a:solidFill>
+                <a:effectLst/>
+                <a:uLnTx/>
+                <a:uFillTx/>
+                <a:latin typeface="Courier New" pitchFamily="49" charset="0"/>
+                <a:cs typeface="Courier New" pitchFamily="49" charset="0"/>
+              </a:rPr>
+              <a:t>, Wiring: </a:t>
+            </a:r>
+            <a:r>
+              <a:rPr kumimoji="0" lang="en-US" sz="1100" b="1" i="0" u="none" strike="noStrike" kern="1200" cap="none" spc="0" normalizeH="0" baseline="0" noProof="0" dirty="0" smtClean="0">
+                <a:ln>
+                  <a:noFill/>
+                </a:ln>
+                <a:solidFill>
+                  <a:schemeClr val="tx1"/>
+                </a:solidFill>
+                <a:effectLst/>
+                <a:uLnTx/>
+                <a:uFillTx/>
+                <a:latin typeface="Courier New" pitchFamily="49" charset="0"/>
+                <a:cs typeface="Courier New" pitchFamily="49" charset="0"/>
+              </a:rPr>
+              <a:t>wiring_2.0</a:t>
+            </a:r>
+            <a:r>
+              <a:rPr kumimoji="0" lang="en-US" sz="1100" b="1" i="0" u="none" strike="noStrike" kern="1200" cap="none" spc="0" normalizeH="0" baseline="0" noProof="0" dirty="0" smtClean="0">
+                <a:ln>
+                  <a:noFill/>
+                </a:ln>
+                <a:solidFill>
+                  <a:schemeClr val="tx1"/>
+                </a:solidFill>
+                <a:effectLst/>
+                <a:uLnTx/>
+                <a:uFillTx/>
+                <a:latin typeface="Courier New" pitchFamily="49" charset="0"/>
+                <a:cs typeface="Courier New" pitchFamily="49" charset="0"/>
+              </a:rPr>
+              <a:t>:</a:t>
+            </a:r>
+          </a:p>
+          <a:p>
+            <a:pPr marL="53975" lvl="0">
+              <a:spcBef>
+                <a:spcPct val="20000"/>
+              </a:spcBef>
+              <a:defRPr/>
+            </a:pPr>
+            <a:r>
+              <a:rPr kumimoji="0" lang="en-US" sz="700" b="1" i="0" u="none" strike="noStrike" kern="1200" cap="none" spc="0" normalizeH="0" baseline="0" noProof="0" dirty="0" smtClean="0">
+                <a:ln>
+                  <a:noFill/>
+                </a:ln>
+                <a:solidFill>
+                  <a:schemeClr val="tx1"/>
+                </a:solidFill>
+                <a:effectLst/>
+                <a:uLnTx/>
+                <a:uFillTx/>
+                <a:latin typeface="Courier New" pitchFamily="49" charset="0"/>
+                <a:cs typeface="Courier New" pitchFamily="49" charset="0"/>
+              </a:rPr>
+              <a:t>&lt;</a:t>
+            </a:r>
+            <a:r>
+              <a:rPr kumimoji="0" lang="en-US" sz="700" b="1" i="0" u="none" strike="noStrike" kern="1200" cap="none" spc="0" normalizeH="0" baseline="0" noProof="0" dirty="0" smtClean="0">
+                <a:ln>
+                  <a:noFill/>
+                </a:ln>
+                <a:solidFill>
+                  <a:schemeClr val="tx1"/>
+                </a:solidFill>
+                <a:effectLst/>
+                <a:uLnTx/>
+                <a:uFillTx/>
+                <a:latin typeface="Courier New" pitchFamily="49" charset="0"/>
+                <a:cs typeface="Courier New" pitchFamily="49" charset="0"/>
+              </a:rPr>
+              <a:t>Geometry&gt;</a:t>
+            </a:r>
+            <a:br>
+              <a:rPr kumimoji="0" lang="en-US" sz="700" b="1" i="0" u="none" strike="noStrike" kern="1200" cap="none" spc="0" normalizeH="0" baseline="0" noProof="0" dirty="0" smtClean="0">
+                <a:ln>
+                  <a:noFill/>
+                </a:ln>
+                <a:solidFill>
+                  <a:schemeClr val="tx1"/>
+                </a:solidFill>
+                <a:effectLst/>
+                <a:uLnTx/>
+                <a:uFillTx/>
+                <a:latin typeface="Courier New" pitchFamily="49" charset="0"/>
+                <a:cs typeface="Courier New" pitchFamily="49" charset="0"/>
+              </a:rPr>
+            </a:br>
+            <a:r>
+              <a:rPr lang="en-US" sz="700" b="1" dirty="0">
+                <a:latin typeface="Courier New" pitchFamily="49" charset="0"/>
+                <a:cs typeface="Courier New" pitchFamily="49" charset="0"/>
+              </a:rPr>
+              <a:t> &lt;Pattern Type="</a:t>
+            </a:r>
+            <a:r>
+              <a:rPr lang="en-US" sz="700" b="1" dirty="0" err="1">
+                <a:latin typeface="Courier New" pitchFamily="49" charset="0"/>
+                <a:cs typeface="Courier New" pitchFamily="49" charset="0"/>
+              </a:rPr>
+              <a:t>NWire</a:t>
+            </a:r>
+            <a:r>
+              <a:rPr lang="en-US" sz="700" b="1" dirty="0">
+                <a:latin typeface="Courier New" pitchFamily="49" charset="0"/>
+                <a:cs typeface="Courier New" pitchFamily="49" charset="0"/>
+              </a:rPr>
+              <a:t>"&gt;</a:t>
+            </a:r>
+          </a:p>
+          <a:p>
+            <a:pPr marL="53975" lvl="0">
+              <a:spcBef>
+                <a:spcPct val="20000"/>
+              </a:spcBef>
+              <a:defRPr/>
+            </a:pPr>
+            <a:r>
+              <a:rPr lang="en-US" sz="700" b="1" dirty="0">
+                <a:latin typeface="Courier New" pitchFamily="49" charset="0"/>
+                <a:cs typeface="Courier New" pitchFamily="49" charset="0"/>
+              </a:rPr>
+              <a:t>        &lt;Wire Name="7:G1_g1" </a:t>
+            </a:r>
+            <a:r>
+              <a:rPr lang="en-US" sz="700" b="1" dirty="0" err="1">
+                <a:latin typeface="Courier New" pitchFamily="49" charset="0"/>
+                <a:cs typeface="Courier New" pitchFamily="49" charset="0"/>
+              </a:rPr>
+              <a:t>EndPointFront</a:t>
+            </a:r>
+            <a:r>
+              <a:rPr lang="en-US" sz="700" b="1" dirty="0">
+                <a:latin typeface="Courier New" pitchFamily="49" charset="0"/>
+                <a:cs typeface="Courier New" pitchFamily="49" charset="0"/>
+              </a:rPr>
+              <a:t>="30.0 0.0 20.0" </a:t>
+            </a:r>
+            <a:r>
+              <a:rPr lang="en-US" sz="700" b="1" dirty="0" err="1">
+                <a:latin typeface="Courier New" pitchFamily="49" charset="0"/>
+                <a:cs typeface="Courier New" pitchFamily="49" charset="0"/>
+              </a:rPr>
+              <a:t>EndPointBack</a:t>
+            </a:r>
+            <a:r>
+              <a:rPr lang="en-US" sz="700" b="1" dirty="0">
+                <a:latin typeface="Courier New" pitchFamily="49" charset="0"/>
+                <a:cs typeface="Courier New" pitchFamily="49" charset="0"/>
+              </a:rPr>
+              <a:t>="30.0 40.0 20.0" /&gt;</a:t>
+            </a:r>
+          </a:p>
+          <a:p>
+            <a:pPr marL="53975" lvl="0">
+              <a:spcBef>
+                <a:spcPct val="20000"/>
+              </a:spcBef>
+              <a:defRPr/>
+            </a:pPr>
+            <a:r>
+              <a:rPr lang="en-US" sz="700" b="1" dirty="0">
+                <a:latin typeface="Courier New" pitchFamily="49" charset="0"/>
+                <a:cs typeface="Courier New" pitchFamily="49" charset="0"/>
+              </a:rPr>
+              <a:t>        &lt;Wire Name="8:L1_h1" </a:t>
+            </a:r>
+            <a:r>
+              <a:rPr lang="en-US" sz="700" b="1" dirty="0" err="1">
+                <a:latin typeface="Courier New" pitchFamily="49" charset="0"/>
+                <a:cs typeface="Courier New" pitchFamily="49" charset="0"/>
+              </a:rPr>
+              <a:t>EndPointFront</a:t>
+            </a:r>
+            <a:r>
+              <a:rPr lang="en-US" sz="700" b="1" dirty="0">
+                <a:latin typeface="Courier New" pitchFamily="49" charset="0"/>
+                <a:cs typeface="Courier New" pitchFamily="49" charset="0"/>
+              </a:rPr>
+              <a:t>="55.0 0.0 20.0" </a:t>
+            </a:r>
+            <a:r>
+              <a:rPr lang="en-US" sz="700" b="1" dirty="0" err="1">
+                <a:latin typeface="Courier New" pitchFamily="49" charset="0"/>
+                <a:cs typeface="Courier New" pitchFamily="49" charset="0"/>
+              </a:rPr>
+              <a:t>EndPointBack</a:t>
+            </a:r>
+            <a:r>
+              <a:rPr lang="en-US" sz="700" b="1" dirty="0">
+                <a:latin typeface="Courier New" pitchFamily="49" charset="0"/>
+                <a:cs typeface="Courier New" pitchFamily="49" charset="0"/>
+              </a:rPr>
+              <a:t>="35.0 40.0 20.0" /&gt;</a:t>
+            </a:r>
+          </a:p>
+          <a:p>
+            <a:pPr marL="53975" lvl="0">
+              <a:spcBef>
+                <a:spcPct val="20000"/>
+              </a:spcBef>
+              <a:defRPr/>
+            </a:pPr>
+            <a:r>
+              <a:rPr lang="en-US" sz="700" b="1" dirty="0">
+                <a:latin typeface="Courier New" pitchFamily="49" charset="0"/>
+                <a:cs typeface="Courier New" pitchFamily="49" charset="0"/>
+              </a:rPr>
+              <a:t>        &lt;Wire Name="9:M1_m1" </a:t>
+            </a:r>
+            <a:r>
+              <a:rPr lang="en-US" sz="700" b="1" dirty="0" err="1">
+                <a:latin typeface="Courier New" pitchFamily="49" charset="0"/>
+                <a:cs typeface="Courier New" pitchFamily="49" charset="0"/>
+              </a:rPr>
+              <a:t>EndPointFront</a:t>
+            </a:r>
+            <a:r>
+              <a:rPr lang="en-US" sz="700" b="1" dirty="0">
+                <a:latin typeface="Courier New" pitchFamily="49" charset="0"/>
+                <a:cs typeface="Courier New" pitchFamily="49" charset="0"/>
+              </a:rPr>
+              <a:t>="60.0 0.0 20.0" </a:t>
+            </a:r>
+            <a:r>
+              <a:rPr lang="en-US" sz="700" b="1" dirty="0" err="1">
+                <a:latin typeface="Courier New" pitchFamily="49" charset="0"/>
+                <a:cs typeface="Courier New" pitchFamily="49" charset="0"/>
+              </a:rPr>
+              <a:t>EndPointBack</a:t>
+            </a:r>
+            <a:r>
+              <a:rPr lang="en-US" sz="700" b="1" dirty="0">
+                <a:latin typeface="Courier New" pitchFamily="49" charset="0"/>
+                <a:cs typeface="Courier New" pitchFamily="49" charset="0"/>
+              </a:rPr>
+              <a:t>="60.0 40.0 20.0" /&gt;</a:t>
+            </a:r>
+          </a:p>
+          <a:p>
+            <a:pPr marL="53975" lvl="0">
+              <a:spcBef>
+                <a:spcPct val="20000"/>
+              </a:spcBef>
+              <a:defRPr/>
+            </a:pPr>
+            <a:r>
+              <a:rPr lang="en-US" sz="700" b="1" dirty="0">
+                <a:latin typeface="Courier New" pitchFamily="49" charset="0"/>
+                <a:cs typeface="Courier New" pitchFamily="49" charset="0"/>
+              </a:rPr>
+              <a:t>      &lt;/Pattern&gt;</a:t>
+            </a:r>
+          </a:p>
+          <a:p>
+            <a:pPr marL="53975" lvl="0">
+              <a:spcBef>
+                <a:spcPct val="20000"/>
+              </a:spcBef>
+              <a:defRPr/>
+            </a:pPr>
+            <a:r>
+              <a:rPr lang="en-US" sz="700" b="1" dirty="0">
+                <a:latin typeface="Courier New" pitchFamily="49" charset="0"/>
+                <a:cs typeface="Courier New" pitchFamily="49" charset="0"/>
+              </a:rPr>
+              <a:t>   </a:t>
+            </a:r>
+            <a:r>
+              <a:rPr lang="en-US" sz="700" b="1" dirty="0" smtClean="0">
+                <a:latin typeface="Courier New" pitchFamily="49" charset="0"/>
+                <a:cs typeface="Courier New" pitchFamily="49" charset="0"/>
+              </a:rPr>
+              <a:t>   </a:t>
+            </a:r>
+            <a:r>
+              <a:rPr lang="en-US" sz="700" b="1" dirty="0">
+                <a:latin typeface="Courier New" pitchFamily="49" charset="0"/>
+                <a:cs typeface="Courier New" pitchFamily="49" charset="0"/>
+              </a:rPr>
+              <a:t>&lt;Pattern Type="</a:t>
+            </a:r>
+            <a:r>
+              <a:rPr lang="en-US" sz="700" b="1" dirty="0" err="1">
+                <a:latin typeface="Courier New" pitchFamily="49" charset="0"/>
+                <a:cs typeface="Courier New" pitchFamily="49" charset="0"/>
+              </a:rPr>
+              <a:t>NWire</a:t>
+            </a:r>
+            <a:r>
+              <a:rPr lang="en-US" sz="700" b="1" dirty="0">
+                <a:latin typeface="Courier New" pitchFamily="49" charset="0"/>
+                <a:cs typeface="Courier New" pitchFamily="49" charset="0"/>
+              </a:rPr>
+              <a:t>"&gt;</a:t>
+            </a:r>
+          </a:p>
+          <a:p>
+            <a:pPr marL="53975" lvl="0">
+              <a:spcBef>
+                <a:spcPct val="20000"/>
+              </a:spcBef>
+              <a:defRPr/>
+            </a:pPr>
+            <a:r>
+              <a:rPr lang="en-US" sz="700" b="1" dirty="0">
+                <a:latin typeface="Courier New" pitchFamily="49" charset="0"/>
+                <a:cs typeface="Courier New" pitchFamily="49" charset="0"/>
+              </a:rPr>
+              <a:t>        &lt;Wire Name="4:G3_g3" </a:t>
+            </a:r>
+            <a:r>
+              <a:rPr lang="en-US" sz="700" b="1" dirty="0" err="1">
+                <a:latin typeface="Courier New" pitchFamily="49" charset="0"/>
+                <a:cs typeface="Courier New" pitchFamily="49" charset="0"/>
+              </a:rPr>
+              <a:t>EndPointFront</a:t>
+            </a:r>
+            <a:r>
+              <a:rPr lang="en-US" sz="700" b="1" dirty="0">
+                <a:latin typeface="Courier New" pitchFamily="49" charset="0"/>
+                <a:cs typeface="Courier New" pitchFamily="49" charset="0"/>
+              </a:rPr>
+              <a:t>="30.0 0.0 10.0" </a:t>
+            </a:r>
+            <a:r>
+              <a:rPr lang="en-US" sz="700" b="1" dirty="0" err="1">
+                <a:latin typeface="Courier New" pitchFamily="49" charset="0"/>
+                <a:cs typeface="Courier New" pitchFamily="49" charset="0"/>
+              </a:rPr>
+              <a:t>EndPointBack</a:t>
+            </a:r>
+            <a:r>
+              <a:rPr lang="en-US" sz="700" b="1" dirty="0">
+                <a:latin typeface="Courier New" pitchFamily="49" charset="0"/>
+                <a:cs typeface="Courier New" pitchFamily="49" charset="0"/>
+              </a:rPr>
+              <a:t>="30.0 40.0 10.0" /&gt;</a:t>
+            </a:r>
+          </a:p>
+          <a:p>
+            <a:pPr marL="53975" lvl="0">
+              <a:spcBef>
+                <a:spcPct val="20000"/>
+              </a:spcBef>
+              <a:defRPr/>
+            </a:pPr>
+            <a:r>
+              <a:rPr lang="en-US" sz="700" b="1" dirty="0">
+                <a:latin typeface="Courier New" pitchFamily="49" charset="0"/>
+                <a:cs typeface="Courier New" pitchFamily="49" charset="0"/>
+              </a:rPr>
+              <a:t>        &lt;Wire Name="5:H3_l3" </a:t>
+            </a:r>
+            <a:r>
+              <a:rPr lang="en-US" sz="700" b="1" dirty="0" err="1">
+                <a:latin typeface="Courier New" pitchFamily="49" charset="0"/>
+                <a:cs typeface="Courier New" pitchFamily="49" charset="0"/>
+              </a:rPr>
+              <a:t>EndPointFront</a:t>
+            </a:r>
+            <a:r>
+              <a:rPr lang="en-US" sz="700" b="1" dirty="0">
+                <a:latin typeface="Courier New" pitchFamily="49" charset="0"/>
+                <a:cs typeface="Courier New" pitchFamily="49" charset="0"/>
+              </a:rPr>
+              <a:t>="35.0 0.0 10.0" </a:t>
+            </a:r>
+            <a:r>
+              <a:rPr lang="en-US" sz="700" b="1" dirty="0" err="1">
+                <a:latin typeface="Courier New" pitchFamily="49" charset="0"/>
+                <a:cs typeface="Courier New" pitchFamily="49" charset="0"/>
+              </a:rPr>
+              <a:t>EndPointBack</a:t>
+            </a:r>
+            <a:r>
+              <a:rPr lang="en-US" sz="700" b="1" dirty="0">
+                <a:latin typeface="Courier New" pitchFamily="49" charset="0"/>
+                <a:cs typeface="Courier New" pitchFamily="49" charset="0"/>
+              </a:rPr>
+              <a:t>="55.0 40.0 10.0" /&gt;</a:t>
+            </a:r>
+          </a:p>
+          <a:p>
+            <a:pPr marL="53975" lvl="0">
+              <a:spcBef>
+                <a:spcPct val="20000"/>
+              </a:spcBef>
+              <a:defRPr/>
+            </a:pPr>
+            <a:r>
+              <a:rPr lang="en-US" sz="700" b="1" dirty="0">
+                <a:latin typeface="Courier New" pitchFamily="49" charset="0"/>
+                <a:cs typeface="Courier New" pitchFamily="49" charset="0"/>
+              </a:rPr>
+              <a:t>        &lt;Wire Name="6:M3_m3" </a:t>
+            </a:r>
+            <a:r>
+              <a:rPr lang="en-US" sz="700" b="1" dirty="0" err="1">
+                <a:latin typeface="Courier New" pitchFamily="49" charset="0"/>
+                <a:cs typeface="Courier New" pitchFamily="49" charset="0"/>
+              </a:rPr>
+              <a:t>EndPointFront</a:t>
+            </a:r>
+            <a:r>
+              <a:rPr lang="en-US" sz="700" b="1" dirty="0">
+                <a:latin typeface="Courier New" pitchFamily="49" charset="0"/>
+                <a:cs typeface="Courier New" pitchFamily="49" charset="0"/>
+              </a:rPr>
+              <a:t>="60.0 0.0 10.0" </a:t>
+            </a:r>
+            <a:r>
+              <a:rPr lang="en-US" sz="700" b="1" dirty="0" err="1">
+                <a:latin typeface="Courier New" pitchFamily="49" charset="0"/>
+                <a:cs typeface="Courier New" pitchFamily="49" charset="0"/>
+              </a:rPr>
+              <a:t>EndPointBack</a:t>
+            </a:r>
+            <a:r>
+              <a:rPr lang="en-US" sz="700" b="1" dirty="0">
+                <a:latin typeface="Courier New" pitchFamily="49" charset="0"/>
+                <a:cs typeface="Courier New" pitchFamily="49" charset="0"/>
+              </a:rPr>
+              <a:t>="60.0 40.0 10.0" /&gt;</a:t>
+            </a:r>
+          </a:p>
+          <a:p>
+            <a:pPr marL="53975" lvl="0">
+              <a:spcBef>
+                <a:spcPct val="20000"/>
+              </a:spcBef>
+              <a:defRPr/>
+            </a:pPr>
+            <a:r>
+              <a:rPr lang="en-US" sz="700" b="1" dirty="0">
+                <a:latin typeface="Courier New" pitchFamily="49" charset="0"/>
+                <a:cs typeface="Courier New" pitchFamily="49" charset="0"/>
+              </a:rPr>
+              <a:t>      &lt;/Pattern&gt;</a:t>
+            </a:r>
+          </a:p>
+          <a:p>
+            <a:pPr marL="53975" lvl="0">
+              <a:spcBef>
+                <a:spcPct val="20000"/>
+              </a:spcBef>
+              <a:defRPr/>
+            </a:pPr>
+            <a:r>
+              <a:rPr lang="en-US" sz="700" b="1" dirty="0">
+                <a:latin typeface="Courier New" pitchFamily="49" charset="0"/>
+                <a:cs typeface="Courier New" pitchFamily="49" charset="0"/>
+              </a:rPr>
+              <a:t>      &lt;Pattern Type="</a:t>
+            </a:r>
+            <a:r>
+              <a:rPr lang="en-US" sz="700" b="1" dirty="0" err="1">
+                <a:latin typeface="Courier New" pitchFamily="49" charset="0"/>
+                <a:cs typeface="Courier New" pitchFamily="49" charset="0"/>
+              </a:rPr>
+              <a:t>NWire</a:t>
+            </a:r>
+            <a:r>
+              <a:rPr lang="en-US" sz="700" b="1" dirty="0">
+                <a:latin typeface="Courier New" pitchFamily="49" charset="0"/>
+                <a:cs typeface="Courier New" pitchFamily="49" charset="0"/>
+              </a:rPr>
+              <a:t>"&gt;</a:t>
+            </a:r>
+          </a:p>
+          <a:p>
+            <a:pPr marL="53975" lvl="0">
+              <a:spcBef>
+                <a:spcPct val="20000"/>
+              </a:spcBef>
+              <a:defRPr/>
+            </a:pPr>
+            <a:r>
+              <a:rPr lang="en-US" sz="700" b="1" dirty="0">
+                <a:latin typeface="Courier New" pitchFamily="49" charset="0"/>
+                <a:cs typeface="Courier New" pitchFamily="49" charset="0"/>
+              </a:rPr>
+              <a:t>        &lt;Wire Name="1:H5_h5" </a:t>
+            </a:r>
+            <a:r>
+              <a:rPr lang="en-US" sz="700" b="1" dirty="0" err="1">
+                <a:latin typeface="Courier New" pitchFamily="49" charset="0"/>
+                <a:cs typeface="Courier New" pitchFamily="49" charset="0"/>
+              </a:rPr>
+              <a:t>EndPointFront</a:t>
+            </a:r>
+            <a:r>
+              <a:rPr lang="en-US" sz="700" b="1" dirty="0">
+                <a:latin typeface="Courier New" pitchFamily="49" charset="0"/>
+                <a:cs typeface="Courier New" pitchFamily="49" charset="0"/>
+              </a:rPr>
+              <a:t>="35.0 0.0 0.0" </a:t>
+            </a:r>
+            <a:r>
+              <a:rPr lang="en-US" sz="700" b="1" dirty="0" err="1">
+                <a:latin typeface="Courier New" pitchFamily="49" charset="0"/>
+                <a:cs typeface="Courier New" pitchFamily="49" charset="0"/>
+              </a:rPr>
+              <a:t>EndPointBack</a:t>
+            </a:r>
+            <a:r>
+              <a:rPr lang="en-US" sz="700" b="1" dirty="0">
+                <a:latin typeface="Courier New" pitchFamily="49" charset="0"/>
+                <a:cs typeface="Courier New" pitchFamily="49" charset="0"/>
+              </a:rPr>
+              <a:t>="35.0 40.0 0.0" /&gt;</a:t>
+            </a:r>
+          </a:p>
+          <a:p>
+            <a:pPr marL="53975" lvl="0">
+              <a:spcBef>
+                <a:spcPct val="20000"/>
+              </a:spcBef>
+              <a:defRPr/>
+            </a:pPr>
+            <a:r>
+              <a:rPr lang="en-US" sz="700" b="1" dirty="0">
+                <a:latin typeface="Courier New" pitchFamily="49" charset="0"/>
+                <a:cs typeface="Courier New" pitchFamily="49" charset="0"/>
+              </a:rPr>
+              <a:t>        &lt;Wire Name="2:L5_i5" </a:t>
+            </a:r>
+            <a:r>
+              <a:rPr lang="en-US" sz="700" b="1" dirty="0" err="1">
+                <a:latin typeface="Courier New" pitchFamily="49" charset="0"/>
+                <a:cs typeface="Courier New" pitchFamily="49" charset="0"/>
+              </a:rPr>
+              <a:t>EndPointFront</a:t>
+            </a:r>
+            <a:r>
+              <a:rPr lang="en-US" sz="700" b="1" dirty="0">
+                <a:latin typeface="Courier New" pitchFamily="49" charset="0"/>
+                <a:cs typeface="Courier New" pitchFamily="49" charset="0"/>
+              </a:rPr>
+              <a:t>="55.0 0.0 0.0" </a:t>
+            </a:r>
+            <a:r>
+              <a:rPr lang="en-US" sz="700" b="1" dirty="0" err="1">
+                <a:latin typeface="Courier New" pitchFamily="49" charset="0"/>
+                <a:cs typeface="Courier New" pitchFamily="49" charset="0"/>
+              </a:rPr>
+              <a:t>EndPointBack</a:t>
+            </a:r>
+            <a:r>
+              <a:rPr lang="en-US" sz="700" b="1" dirty="0">
+                <a:latin typeface="Courier New" pitchFamily="49" charset="0"/>
+                <a:cs typeface="Courier New" pitchFamily="49" charset="0"/>
+              </a:rPr>
+              <a:t>="40.0 40.0 0.0" /&gt;</a:t>
+            </a:r>
+          </a:p>
+          <a:p>
+            <a:pPr marL="53975" lvl="0">
+              <a:spcBef>
+                <a:spcPct val="20000"/>
+              </a:spcBef>
+              <a:defRPr/>
+            </a:pPr>
+            <a:r>
+              <a:rPr lang="en-US" sz="700" b="1" dirty="0">
+                <a:latin typeface="Courier New" pitchFamily="49" charset="0"/>
+                <a:cs typeface="Courier New" pitchFamily="49" charset="0"/>
+              </a:rPr>
+              <a:t>        &lt;Wire Name="3:M5_m5" </a:t>
+            </a:r>
+            <a:r>
+              <a:rPr lang="en-US" sz="700" b="1" dirty="0" err="1">
+                <a:latin typeface="Courier New" pitchFamily="49" charset="0"/>
+                <a:cs typeface="Courier New" pitchFamily="49" charset="0"/>
+              </a:rPr>
+              <a:t>EndPointFront</a:t>
+            </a:r>
+            <a:r>
+              <a:rPr lang="en-US" sz="700" b="1" dirty="0">
+                <a:latin typeface="Courier New" pitchFamily="49" charset="0"/>
+                <a:cs typeface="Courier New" pitchFamily="49" charset="0"/>
+              </a:rPr>
+              <a:t>="60.0 0.0 0.0" </a:t>
+            </a:r>
+            <a:r>
+              <a:rPr lang="en-US" sz="700" b="1" dirty="0" err="1">
+                <a:latin typeface="Courier New" pitchFamily="49" charset="0"/>
+                <a:cs typeface="Courier New" pitchFamily="49" charset="0"/>
+              </a:rPr>
+              <a:t>EndPointBack</a:t>
+            </a:r>
+            <a:r>
+              <a:rPr lang="en-US" sz="700" b="1" dirty="0">
+                <a:latin typeface="Courier New" pitchFamily="49" charset="0"/>
+                <a:cs typeface="Courier New" pitchFamily="49" charset="0"/>
+              </a:rPr>
+              <a:t>="60.0 40.0 0.0" /&gt;</a:t>
+            </a:r>
+          </a:p>
+          <a:p>
+            <a:pPr marL="53975" lvl="0">
+              <a:spcBef>
+                <a:spcPct val="20000"/>
+              </a:spcBef>
+              <a:defRPr/>
+            </a:pPr>
+            <a:r>
+              <a:rPr lang="en-US" sz="700" b="1" dirty="0">
+                <a:latin typeface="Courier New" pitchFamily="49" charset="0"/>
+                <a:cs typeface="Courier New" pitchFamily="49" charset="0"/>
+              </a:rPr>
+              <a:t>      &lt;/Pattern&gt;</a:t>
+            </a:r>
+            <a:endParaRPr kumimoji="0" lang="en-US" sz="700" b="1" i="0" u="none" strike="noStrike" kern="1200" cap="none" spc="0" normalizeH="0" baseline="0" noProof="0" dirty="0" smtClean="0">
+              <a:ln>
+                <a:noFill/>
+              </a:ln>
+              <a:solidFill>
+                <a:schemeClr val="tx1"/>
+              </a:solidFill>
+              <a:effectLst/>
+              <a:uLnTx/>
+              <a:uFillTx/>
+              <a:latin typeface="Courier New" pitchFamily="49" charset="0"/>
+              <a:cs typeface="Courier New" pitchFamily="49" charset="0"/>
+            </a:endParaRPr>
           </a:p>
           <a:p>
             <a:pPr marL="53975" marR="0" lvl="0" indent="0" algn="l" defTabSz="914400" rtl="0" eaLnBrk="1" fontAlgn="auto" latinLnBrk="0" hangingPunct="1">
@@ -4280,20 +4962,22 @@
               <a:tabLst/>
               <a:defRPr/>
             </a:pPr>
-            <a:endParaRPr kumimoji="0" lang="en-US" sz="700" b="1" i="0" u="none" strike="noStrike" kern="1200" cap="none" spc="0" normalizeH="0" baseline="0" noProof="0" dirty="0" smtClean="0">
-              <a:ln>
-                <a:noFill/>
-              </a:ln>
-              <a:solidFill>
-                <a:schemeClr val="tx1"/>
-              </a:solidFill>
-              <a:effectLst/>
-              <a:uLnTx/>
-              <a:uFillTx/>
-              <a:latin typeface="Courier" pitchFamily="49" charset="0"/>
-              <a:ea typeface="+mn-ea"/>
-              <a:cs typeface="+mn-cs"/>
-            </a:endParaRPr>
+            <a:r>
+              <a:rPr kumimoji="0" lang="en-US" sz="700" b="1" i="0" u="none" strike="noStrike" kern="1200" cap="none" spc="0" normalizeH="0" baseline="0" noProof="0" dirty="0" smtClean="0">
+                <a:ln>
+                  <a:noFill/>
+                </a:ln>
+                <a:solidFill>
+                  <a:schemeClr val="tx1"/>
+                </a:solidFill>
+                <a:effectLst/>
+                <a:uLnTx/>
+                <a:uFillTx/>
+                <a:latin typeface="Courier New" pitchFamily="49" charset="0"/>
+                <a:cs typeface="Courier New" pitchFamily="49" charset="0"/>
+              </a:rPr>
+              <a:t>...</a:t>
+            </a:r>
           </a:p>
           <a:p>
             <a:pPr marL="53975" marR="0" lvl="0" indent="0" algn="l" defTabSz="914400" rtl="0" eaLnBrk="1" fontAlgn="auto" latinLnBrk="0" hangingPunct="1">
@@ -4324,1396 +5008,8 @@
                 <a:effectLst/>
                 <a:uLnTx/>
                 <a:uFillTx/>
-                <a:latin typeface="Courier" pitchFamily="49" charset="0"/>
-                <a:ea typeface="+mn-ea"/>
-                <a:cs typeface="+mn-cs"/>
-              </a:rPr>
-              <a:t>&lt;Geometry&gt;</a:t>
-            </a:r>
-            <a:br>
-              <a:rPr kumimoji="0" lang="en-US" sz="700" b="1" i="0" u="none" strike="noStrike" kern="1200" cap="none" spc="0" normalizeH="0" baseline="0" noProof="0" dirty="0" smtClean="0">
-                <a:ln>
-                  <a:noFill/>
-                </a:ln>
-                <a:solidFill>
-                  <a:schemeClr val="tx1"/>
-                </a:solidFill>
-                <a:effectLst/>
-                <a:uLnTx/>
-                <a:uFillTx/>
-                <a:latin typeface="Courier" pitchFamily="49" charset="0"/>
-                <a:ea typeface="+mn-ea"/>
-                <a:cs typeface="+mn-cs"/>
-              </a:rPr>
-            </a:br>
-            <a:r>
-              <a:rPr kumimoji="0" lang="en-US" sz="700" b="1" i="0" u="none" strike="noStrike" kern="1200" cap="none" spc="0" normalizeH="0" baseline="0" noProof="0" dirty="0" smtClean="0">
-                <a:ln>
-                  <a:noFill/>
-                </a:ln>
-                <a:solidFill>
-                  <a:schemeClr val="tx1"/>
-                </a:solidFill>
-                <a:effectLst/>
-                <a:uLnTx/>
-                <a:uFillTx/>
-                <a:latin typeface="Courier" pitchFamily="49" charset="0"/>
-                <a:ea typeface="+mn-ea"/>
-                <a:cs typeface="+mn-cs"/>
-              </a:rPr>
-              <a:t>      &lt;!-- N wire definitions --&gt;</a:t>
-            </a:r>
-            <a:br>
-              <a:rPr kumimoji="0" lang="en-US" sz="700" b="1" i="0" u="none" strike="noStrike" kern="1200" cap="none" spc="0" normalizeH="0" baseline="0" noProof="0" dirty="0" smtClean="0">
-                <a:ln>
-                  <a:noFill/>
-                </a:ln>
-                <a:solidFill>
-                  <a:schemeClr val="tx1"/>
-                </a:solidFill>
-                <a:effectLst/>
-                <a:uLnTx/>
-                <a:uFillTx/>
-                <a:latin typeface="Courier" pitchFamily="49" charset="0"/>
-                <a:ea typeface="+mn-ea"/>
-                <a:cs typeface="+mn-cs"/>
-              </a:rPr>
-            </a:br>
-            <a:r>
-              <a:rPr kumimoji="0" lang="en-US" sz="700" b="1" i="0" u="none" strike="noStrike" kern="1200" cap="none" spc="0" normalizeH="0" baseline="0" noProof="0" dirty="0" smtClean="0">
-                <a:ln>
-                  <a:noFill/>
-                </a:ln>
-                <a:solidFill>
-                  <a:schemeClr val="tx1"/>
-                </a:solidFill>
-                <a:effectLst/>
-                <a:uLnTx/>
-                <a:uFillTx/>
-                <a:latin typeface="Courier" pitchFamily="49" charset="0"/>
-                <a:ea typeface="+mn-ea"/>
-                <a:cs typeface="+mn-cs"/>
-              </a:rPr>
-              <a:t>      &lt;</a:t>
-            </a:r>
-            <a:r>
-              <a:rPr kumimoji="0" lang="en-US" sz="700" b="1" i="0" u="none" strike="noStrike" kern="1200" cap="none" spc="0" normalizeH="0" baseline="0" noProof="0" dirty="0" err="1" smtClean="0">
-                <a:ln>
-                  <a:noFill/>
-                </a:ln>
-                <a:solidFill>
-                  <a:schemeClr val="tx1"/>
-                </a:solidFill>
-                <a:effectLst/>
-                <a:uLnTx/>
-                <a:uFillTx/>
-                <a:latin typeface="Courier" pitchFamily="49" charset="0"/>
-                <a:ea typeface="+mn-ea"/>
-                <a:cs typeface="+mn-cs"/>
-              </a:rPr>
-              <a:t>NWire</a:t>
-            </a:r>
-            <a:r>
-              <a:rPr kumimoji="0" lang="en-US" sz="700" b="1" i="0" u="none" strike="noStrike" kern="1200" cap="none" spc="0" normalizeH="0" baseline="0" noProof="0" dirty="0" smtClean="0">
-                <a:ln>
-                  <a:noFill/>
-                </a:ln>
-                <a:solidFill>
-                  <a:schemeClr val="tx1"/>
-                </a:solidFill>
-                <a:effectLst/>
-                <a:uLnTx/>
-                <a:uFillTx/>
-                <a:latin typeface="Courier" pitchFamily="49" charset="0"/>
-                <a:ea typeface="+mn-ea"/>
-                <a:cs typeface="+mn-cs"/>
-              </a:rPr>
-              <a:t>&gt;</a:t>
-            </a:r>
-            <a:br>
-              <a:rPr kumimoji="0" lang="en-US" sz="700" b="1" i="0" u="none" strike="noStrike" kern="1200" cap="none" spc="0" normalizeH="0" baseline="0" noProof="0" dirty="0" smtClean="0">
-                <a:ln>
-                  <a:noFill/>
-                </a:ln>
-                <a:solidFill>
-                  <a:schemeClr val="tx1"/>
-                </a:solidFill>
-                <a:effectLst/>
-                <a:uLnTx/>
-                <a:uFillTx/>
-                <a:latin typeface="Courier" pitchFamily="49" charset="0"/>
-                <a:ea typeface="+mn-ea"/>
-                <a:cs typeface="+mn-cs"/>
-              </a:rPr>
-            </a:br>
-            <a:r>
-              <a:rPr kumimoji="0" lang="en-US" sz="700" b="1" i="0" u="none" strike="noStrike" kern="1200" cap="none" spc="0" normalizeH="0" baseline="0" noProof="0" dirty="0" smtClean="0">
-                <a:ln>
-                  <a:noFill/>
-                </a:ln>
-                <a:solidFill>
-                  <a:schemeClr val="tx1"/>
-                </a:solidFill>
-                <a:effectLst/>
-                <a:uLnTx/>
-                <a:uFillTx/>
-                <a:latin typeface="Courier" pitchFamily="49" charset="0"/>
-                <a:ea typeface="+mn-ea"/>
-                <a:cs typeface="+mn-cs"/>
-              </a:rPr>
-              <a:t>        &lt;Wire Id="1" Name="E3_e3" </a:t>
-            </a:r>
-            <a:r>
-              <a:rPr kumimoji="0" lang="en-US" sz="700" b="1" i="0" u="none" strike="noStrike" kern="1200" cap="none" spc="0" normalizeH="0" baseline="0" noProof="0" dirty="0" err="1" smtClean="0">
-                <a:ln>
-                  <a:noFill/>
-                </a:ln>
-                <a:solidFill>
-                  <a:schemeClr val="tx1"/>
-                </a:solidFill>
-                <a:effectLst/>
-                <a:uLnTx/>
-                <a:uFillTx/>
-                <a:latin typeface="Courier" pitchFamily="49" charset="0"/>
-                <a:ea typeface="+mn-ea"/>
-                <a:cs typeface="+mn-cs"/>
-              </a:rPr>
-              <a:t>EndPointFront</a:t>
-            </a:r>
-            <a:r>
-              <a:rPr kumimoji="0" lang="en-US" sz="700" b="1" i="0" u="none" strike="noStrike" kern="1200" cap="none" spc="0" normalizeH="0" baseline="0" noProof="0" dirty="0" smtClean="0">
-                <a:ln>
-                  <a:noFill/>
-                </a:ln>
-                <a:solidFill>
-                  <a:schemeClr val="tx1"/>
-                </a:solidFill>
-                <a:effectLst/>
-                <a:uLnTx/>
-                <a:uFillTx/>
-                <a:latin typeface="Courier" pitchFamily="49" charset="0"/>
-                <a:ea typeface="+mn-ea"/>
-                <a:cs typeface="+mn-cs"/>
-              </a:rPr>
-              <a:t>="</a:t>
-            </a:r>
-            <a:r>
-              <a:rPr kumimoji="0" lang="en-US" sz="700" b="1" i="0" u="none" strike="noStrike" kern="1200" cap="none" spc="0" normalizeH="0" baseline="0" noProof="0" dirty="0" smtClean="0">
-                <a:ln>
-                  <a:noFill/>
-                </a:ln>
-                <a:solidFill>
-                  <a:srgbClr val="0070C0"/>
-                </a:solidFill>
-                <a:effectLst/>
-                <a:uLnTx/>
-                <a:uFillTx/>
-                <a:latin typeface="Courier" pitchFamily="49" charset="0"/>
-                <a:ea typeface="+mn-ea"/>
-                <a:cs typeface="+mn-cs"/>
-              </a:rPr>
-              <a:t>20.0 0.0 5.0</a:t>
-            </a:r>
-            <a:r>
-              <a:rPr kumimoji="0" lang="en-US" sz="700" b="1" i="0" u="none" strike="noStrike" kern="1200" cap="none" spc="0" normalizeH="0" baseline="0" noProof="0" dirty="0" smtClean="0">
-                <a:ln>
-                  <a:noFill/>
-                </a:ln>
-                <a:solidFill>
-                  <a:schemeClr val="tx1"/>
-                </a:solidFill>
-                <a:effectLst/>
-                <a:uLnTx/>
-                <a:uFillTx/>
-                <a:latin typeface="Courier" pitchFamily="49" charset="0"/>
-                <a:ea typeface="+mn-ea"/>
-                <a:cs typeface="+mn-cs"/>
-              </a:rPr>
-              <a:t>" </a:t>
-            </a:r>
-            <a:r>
-              <a:rPr kumimoji="0" lang="en-US" sz="700" b="1" i="0" u="none" strike="noStrike" kern="1200" cap="none" spc="0" normalizeH="0" baseline="0" noProof="0" dirty="0" err="1" smtClean="0">
-                <a:ln>
-                  <a:noFill/>
-                </a:ln>
-                <a:solidFill>
-                  <a:schemeClr val="tx1"/>
-                </a:solidFill>
-                <a:effectLst/>
-                <a:uLnTx/>
-                <a:uFillTx/>
-                <a:latin typeface="Courier" pitchFamily="49" charset="0"/>
-                <a:ea typeface="+mn-ea"/>
-                <a:cs typeface="+mn-cs"/>
-              </a:rPr>
-              <a:t>EndPointBack</a:t>
-            </a:r>
-            <a:r>
-              <a:rPr kumimoji="0" lang="en-US" sz="700" b="1" i="0" u="none" strike="noStrike" kern="1200" cap="none" spc="0" normalizeH="0" baseline="0" noProof="0" dirty="0" smtClean="0">
-                <a:ln>
-                  <a:noFill/>
-                </a:ln>
-                <a:solidFill>
-                  <a:schemeClr val="tx1"/>
-                </a:solidFill>
-                <a:effectLst/>
-                <a:uLnTx/>
-                <a:uFillTx/>
-                <a:latin typeface="Courier" pitchFamily="49" charset="0"/>
-                <a:ea typeface="+mn-ea"/>
-                <a:cs typeface="+mn-cs"/>
-              </a:rPr>
-              <a:t>="</a:t>
-            </a:r>
-            <a:r>
-              <a:rPr kumimoji="0" lang="en-US" sz="700" b="1" i="0" u="none" strike="noStrike" kern="1200" cap="none" spc="0" normalizeH="0" baseline="0" noProof="0" dirty="0" smtClean="0">
-                <a:ln>
-                  <a:noFill/>
-                </a:ln>
-                <a:solidFill>
-                  <a:srgbClr val="0070C0"/>
-                </a:solidFill>
-                <a:effectLst/>
-                <a:uLnTx/>
-                <a:uFillTx/>
-                <a:latin typeface="Courier" pitchFamily="49" charset="0"/>
-                <a:ea typeface="+mn-ea"/>
-                <a:cs typeface="+mn-cs"/>
-              </a:rPr>
-              <a:t>20.0 40.0 5.0</a:t>
-            </a:r>
-            <a:r>
-              <a:rPr kumimoji="0" lang="en-US" sz="700" b="1" i="0" u="none" strike="noStrike" kern="1200" cap="none" spc="0" normalizeH="0" baseline="0" noProof="0" dirty="0" smtClean="0">
-                <a:ln>
-                  <a:noFill/>
-                </a:ln>
-                <a:solidFill>
-                  <a:schemeClr val="tx1"/>
-                </a:solidFill>
-                <a:effectLst/>
-                <a:uLnTx/>
-                <a:uFillTx/>
-                <a:latin typeface="Courier" pitchFamily="49" charset="0"/>
-                <a:ea typeface="+mn-ea"/>
-                <a:cs typeface="+mn-cs"/>
-              </a:rPr>
-              <a:t>" /&gt;</a:t>
-            </a:r>
-            <a:br>
-              <a:rPr kumimoji="0" lang="en-US" sz="700" b="1" i="0" u="none" strike="noStrike" kern="1200" cap="none" spc="0" normalizeH="0" baseline="0" noProof="0" dirty="0" smtClean="0">
-                <a:ln>
-                  <a:noFill/>
-                </a:ln>
-                <a:solidFill>
-                  <a:schemeClr val="tx1"/>
-                </a:solidFill>
-                <a:effectLst/>
-                <a:uLnTx/>
-                <a:uFillTx/>
-                <a:latin typeface="Courier" pitchFamily="49" charset="0"/>
-                <a:ea typeface="+mn-ea"/>
-                <a:cs typeface="+mn-cs"/>
-              </a:rPr>
-            </a:br>
-            <a:r>
-              <a:rPr kumimoji="0" lang="en-US" sz="700" b="1" i="0" u="none" strike="noStrike" kern="1200" cap="none" spc="0" normalizeH="0" baseline="0" noProof="0" dirty="0" smtClean="0">
-                <a:ln>
-                  <a:noFill/>
-                </a:ln>
-                <a:solidFill>
-                  <a:schemeClr val="tx1"/>
-                </a:solidFill>
-                <a:effectLst/>
-                <a:uLnTx/>
-                <a:uFillTx/>
-                <a:latin typeface="Courier" pitchFamily="49" charset="0"/>
-                <a:ea typeface="+mn-ea"/>
-                <a:cs typeface="+mn-cs"/>
-              </a:rPr>
-              <a:t>        &lt;Wire Id="2" Name="F3_j3" </a:t>
-            </a:r>
-            <a:r>
-              <a:rPr kumimoji="0" lang="en-US" sz="700" b="1" i="0" u="none" strike="noStrike" kern="1200" cap="none" spc="0" normalizeH="0" baseline="0" noProof="0" dirty="0" err="1" smtClean="0">
-                <a:ln>
-                  <a:noFill/>
-                </a:ln>
-                <a:solidFill>
-                  <a:schemeClr val="tx1"/>
-                </a:solidFill>
-                <a:effectLst/>
-                <a:uLnTx/>
-                <a:uFillTx/>
-                <a:latin typeface="Courier" pitchFamily="49" charset="0"/>
-                <a:ea typeface="+mn-ea"/>
-                <a:cs typeface="+mn-cs"/>
-              </a:rPr>
-              <a:t>EndPointFront</a:t>
-            </a:r>
-            <a:r>
-              <a:rPr kumimoji="0" lang="en-US" sz="700" b="1" i="0" u="none" strike="noStrike" kern="1200" cap="none" spc="0" normalizeH="0" baseline="0" noProof="0" dirty="0" smtClean="0">
-                <a:ln>
-                  <a:noFill/>
-                </a:ln>
-                <a:solidFill>
-                  <a:schemeClr val="tx1"/>
-                </a:solidFill>
-                <a:effectLst/>
-                <a:uLnTx/>
-                <a:uFillTx/>
-                <a:latin typeface="Courier" pitchFamily="49" charset="0"/>
-                <a:ea typeface="+mn-ea"/>
-                <a:cs typeface="+mn-cs"/>
-              </a:rPr>
-              <a:t>="</a:t>
-            </a:r>
-            <a:r>
-              <a:rPr kumimoji="0" lang="en-US" sz="700" b="1" i="0" u="none" strike="noStrike" kern="1200" cap="none" spc="0" normalizeH="0" baseline="0" noProof="0" dirty="0" smtClean="0">
-                <a:ln>
-                  <a:noFill/>
-                </a:ln>
-                <a:solidFill>
-                  <a:srgbClr val="0070C0"/>
-                </a:solidFill>
-                <a:effectLst/>
-                <a:uLnTx/>
-                <a:uFillTx/>
-                <a:latin typeface="Courier" pitchFamily="49" charset="0"/>
-                <a:ea typeface="+mn-ea"/>
-                <a:cs typeface="+mn-cs"/>
-              </a:rPr>
-              <a:t>25.0 0.0 5.0</a:t>
-            </a:r>
-            <a:r>
-              <a:rPr kumimoji="0" lang="en-US" sz="700" b="1" i="0" u="none" strike="noStrike" kern="1200" cap="none" spc="0" normalizeH="0" baseline="0" noProof="0" dirty="0" smtClean="0">
-                <a:ln>
-                  <a:noFill/>
-                </a:ln>
-                <a:solidFill>
-                  <a:schemeClr val="tx1"/>
-                </a:solidFill>
-                <a:effectLst/>
-                <a:uLnTx/>
-                <a:uFillTx/>
-                <a:latin typeface="Courier" pitchFamily="49" charset="0"/>
-                <a:ea typeface="+mn-ea"/>
-                <a:cs typeface="+mn-cs"/>
-              </a:rPr>
-              <a:t>" </a:t>
-            </a:r>
-            <a:r>
-              <a:rPr kumimoji="0" lang="en-US" sz="700" b="1" i="0" u="none" strike="noStrike" kern="1200" cap="none" spc="0" normalizeH="0" baseline="0" noProof="0" dirty="0" err="1" smtClean="0">
-                <a:ln>
-                  <a:noFill/>
-                </a:ln>
-                <a:solidFill>
-                  <a:schemeClr val="tx1"/>
-                </a:solidFill>
-                <a:effectLst/>
-                <a:uLnTx/>
-                <a:uFillTx/>
-                <a:latin typeface="Courier" pitchFamily="49" charset="0"/>
-                <a:ea typeface="+mn-ea"/>
-                <a:cs typeface="+mn-cs"/>
-              </a:rPr>
-              <a:t>EndPointBack</a:t>
-            </a:r>
-            <a:r>
-              <a:rPr kumimoji="0" lang="en-US" sz="700" b="1" i="0" u="none" strike="noStrike" kern="1200" cap="none" spc="0" normalizeH="0" baseline="0" noProof="0" dirty="0" smtClean="0">
-                <a:ln>
-                  <a:noFill/>
-                </a:ln>
-                <a:solidFill>
-                  <a:schemeClr val="tx1"/>
-                </a:solidFill>
-                <a:effectLst/>
-                <a:uLnTx/>
-                <a:uFillTx/>
-                <a:latin typeface="Courier" pitchFamily="49" charset="0"/>
-                <a:ea typeface="+mn-ea"/>
-                <a:cs typeface="+mn-cs"/>
-              </a:rPr>
-              <a:t>="</a:t>
-            </a:r>
-            <a:r>
-              <a:rPr kumimoji="0" lang="en-US" sz="700" b="1" i="0" u="none" strike="noStrike" kern="1200" cap="none" spc="0" normalizeH="0" baseline="0" noProof="0" dirty="0" smtClean="0">
-                <a:ln>
-                  <a:noFill/>
-                </a:ln>
-                <a:solidFill>
-                  <a:srgbClr val="0070C0"/>
-                </a:solidFill>
-                <a:effectLst/>
-                <a:uLnTx/>
-                <a:uFillTx/>
-                <a:latin typeface="Courier" pitchFamily="49" charset="0"/>
-                <a:ea typeface="+mn-ea"/>
-                <a:cs typeface="+mn-cs"/>
-              </a:rPr>
-              <a:t>45.0 40.0 5.0</a:t>
-            </a:r>
-            <a:r>
-              <a:rPr kumimoji="0" lang="en-US" sz="700" b="1" i="0" u="none" strike="noStrike" kern="1200" cap="none" spc="0" normalizeH="0" baseline="0" noProof="0" dirty="0" smtClean="0">
-                <a:ln>
-                  <a:noFill/>
-                </a:ln>
-                <a:solidFill>
-                  <a:schemeClr val="tx1"/>
-                </a:solidFill>
-                <a:effectLst/>
-                <a:uLnTx/>
-                <a:uFillTx/>
-                <a:latin typeface="Courier" pitchFamily="49" charset="0"/>
-                <a:ea typeface="+mn-ea"/>
-                <a:cs typeface="+mn-cs"/>
-              </a:rPr>
-              <a:t>" /&gt;</a:t>
-            </a:r>
-            <a:br>
-              <a:rPr kumimoji="0" lang="en-US" sz="700" b="1" i="0" u="none" strike="noStrike" kern="1200" cap="none" spc="0" normalizeH="0" baseline="0" noProof="0" dirty="0" smtClean="0">
-                <a:ln>
-                  <a:noFill/>
-                </a:ln>
-                <a:solidFill>
-                  <a:schemeClr val="tx1"/>
-                </a:solidFill>
-                <a:effectLst/>
-                <a:uLnTx/>
-                <a:uFillTx/>
-                <a:latin typeface="Courier" pitchFamily="49" charset="0"/>
-                <a:ea typeface="+mn-ea"/>
-                <a:cs typeface="+mn-cs"/>
-              </a:rPr>
-            </a:br>
-            <a:r>
-              <a:rPr kumimoji="0" lang="en-US" sz="700" b="1" i="0" u="none" strike="noStrike" kern="1200" cap="none" spc="0" normalizeH="0" baseline="0" noProof="0" dirty="0" smtClean="0">
-                <a:ln>
-                  <a:noFill/>
-                </a:ln>
-                <a:solidFill>
-                  <a:schemeClr val="tx1"/>
-                </a:solidFill>
-                <a:effectLst/>
-                <a:uLnTx/>
-                <a:uFillTx/>
-                <a:latin typeface="Courier" pitchFamily="49" charset="0"/>
-                <a:ea typeface="+mn-ea"/>
-                <a:cs typeface="+mn-cs"/>
-              </a:rPr>
-              <a:t>        &lt;Wire Id="3" Name="K3_k3" </a:t>
-            </a:r>
-            <a:r>
-              <a:rPr kumimoji="0" lang="en-US" sz="700" b="1" i="0" u="none" strike="noStrike" kern="1200" cap="none" spc="0" normalizeH="0" baseline="0" noProof="0" dirty="0" err="1" smtClean="0">
-                <a:ln>
-                  <a:noFill/>
-                </a:ln>
-                <a:solidFill>
-                  <a:schemeClr val="tx1"/>
-                </a:solidFill>
-                <a:effectLst/>
-                <a:uLnTx/>
-                <a:uFillTx/>
-                <a:latin typeface="Courier" pitchFamily="49" charset="0"/>
-                <a:ea typeface="+mn-ea"/>
-                <a:cs typeface="+mn-cs"/>
-              </a:rPr>
-              <a:t>EndPointFront</a:t>
-            </a:r>
-            <a:r>
-              <a:rPr kumimoji="0" lang="en-US" sz="700" b="1" i="0" u="none" strike="noStrike" kern="1200" cap="none" spc="0" normalizeH="0" baseline="0" noProof="0" dirty="0" smtClean="0">
-                <a:ln>
-                  <a:noFill/>
-                </a:ln>
-                <a:solidFill>
-                  <a:schemeClr val="tx1"/>
-                </a:solidFill>
-                <a:effectLst/>
-                <a:uLnTx/>
-                <a:uFillTx/>
-                <a:latin typeface="Courier" pitchFamily="49" charset="0"/>
-                <a:ea typeface="+mn-ea"/>
-                <a:cs typeface="+mn-cs"/>
-              </a:rPr>
-              <a:t>="</a:t>
-            </a:r>
-            <a:r>
-              <a:rPr kumimoji="0" lang="en-US" sz="700" b="1" i="0" u="none" strike="noStrike" kern="1200" cap="none" spc="0" normalizeH="0" baseline="0" noProof="0" dirty="0" smtClean="0">
-                <a:ln>
-                  <a:noFill/>
-                </a:ln>
-                <a:solidFill>
-                  <a:srgbClr val="0070C0"/>
-                </a:solidFill>
-                <a:effectLst/>
-                <a:uLnTx/>
-                <a:uFillTx/>
-                <a:latin typeface="Courier" pitchFamily="49" charset="0"/>
-                <a:ea typeface="+mn-ea"/>
-                <a:cs typeface="+mn-cs"/>
-              </a:rPr>
-              <a:t>50.0 0.0 5.0</a:t>
-            </a:r>
-            <a:r>
-              <a:rPr kumimoji="0" lang="en-US" sz="700" b="1" i="0" u="none" strike="noStrike" kern="1200" cap="none" spc="0" normalizeH="0" baseline="0" noProof="0" dirty="0" smtClean="0">
-                <a:ln>
-                  <a:noFill/>
-                </a:ln>
-                <a:solidFill>
-                  <a:schemeClr val="tx1"/>
-                </a:solidFill>
-                <a:effectLst/>
-                <a:uLnTx/>
-                <a:uFillTx/>
-                <a:latin typeface="Courier" pitchFamily="49" charset="0"/>
-                <a:ea typeface="+mn-ea"/>
-                <a:cs typeface="+mn-cs"/>
-              </a:rPr>
-              <a:t>" </a:t>
-            </a:r>
-            <a:r>
-              <a:rPr kumimoji="0" lang="en-US" sz="700" b="1" i="0" u="none" strike="noStrike" kern="1200" cap="none" spc="0" normalizeH="0" baseline="0" noProof="0" dirty="0" err="1" smtClean="0">
-                <a:ln>
-                  <a:noFill/>
-                </a:ln>
-                <a:solidFill>
-                  <a:schemeClr val="tx1"/>
-                </a:solidFill>
-                <a:effectLst/>
-                <a:uLnTx/>
-                <a:uFillTx/>
-                <a:latin typeface="Courier" pitchFamily="49" charset="0"/>
-                <a:ea typeface="+mn-ea"/>
-                <a:cs typeface="+mn-cs"/>
-              </a:rPr>
-              <a:t>EndPointBack</a:t>
-            </a:r>
-            <a:r>
-              <a:rPr kumimoji="0" lang="en-US" sz="700" b="1" i="0" u="none" strike="noStrike" kern="1200" cap="none" spc="0" normalizeH="0" baseline="0" noProof="0" dirty="0" smtClean="0">
-                <a:ln>
-                  <a:noFill/>
-                </a:ln>
-                <a:solidFill>
-                  <a:schemeClr val="tx1"/>
-                </a:solidFill>
-                <a:effectLst/>
-                <a:uLnTx/>
-                <a:uFillTx/>
-                <a:latin typeface="Courier" pitchFamily="49" charset="0"/>
-                <a:ea typeface="+mn-ea"/>
-                <a:cs typeface="+mn-cs"/>
-              </a:rPr>
-              <a:t>="</a:t>
-            </a:r>
-            <a:r>
-              <a:rPr kumimoji="0" lang="en-US" sz="700" b="1" i="0" u="none" strike="noStrike" kern="1200" cap="none" spc="0" normalizeH="0" baseline="0" noProof="0" dirty="0" smtClean="0">
-                <a:ln>
-                  <a:noFill/>
-                </a:ln>
-                <a:solidFill>
-                  <a:srgbClr val="0070C0"/>
-                </a:solidFill>
-                <a:effectLst/>
-                <a:uLnTx/>
-                <a:uFillTx/>
-                <a:latin typeface="Courier" pitchFamily="49" charset="0"/>
-                <a:ea typeface="+mn-ea"/>
-                <a:cs typeface="+mn-cs"/>
-              </a:rPr>
-              <a:t>50.0 40.0 5.0</a:t>
-            </a:r>
-            <a:r>
-              <a:rPr kumimoji="0" lang="en-US" sz="700" b="1" i="0" u="none" strike="noStrike" kern="1200" cap="none" spc="0" normalizeH="0" baseline="0" noProof="0" dirty="0" smtClean="0">
-                <a:ln>
-                  <a:noFill/>
-                </a:ln>
-                <a:solidFill>
-                  <a:schemeClr val="tx1"/>
-                </a:solidFill>
-                <a:effectLst/>
-                <a:uLnTx/>
-                <a:uFillTx/>
-                <a:latin typeface="Courier" pitchFamily="49" charset="0"/>
-                <a:ea typeface="+mn-ea"/>
-                <a:cs typeface="+mn-cs"/>
-              </a:rPr>
-              <a:t>" /&gt;</a:t>
-            </a:r>
-            <a:br>
-              <a:rPr kumimoji="0" lang="en-US" sz="700" b="1" i="0" u="none" strike="noStrike" kern="1200" cap="none" spc="0" normalizeH="0" baseline="0" noProof="0" dirty="0" smtClean="0">
-                <a:ln>
-                  <a:noFill/>
-                </a:ln>
-                <a:solidFill>
-                  <a:schemeClr val="tx1"/>
-                </a:solidFill>
-                <a:effectLst/>
-                <a:uLnTx/>
-                <a:uFillTx/>
-                <a:latin typeface="Courier" pitchFamily="49" charset="0"/>
-                <a:ea typeface="+mn-ea"/>
-                <a:cs typeface="+mn-cs"/>
-              </a:rPr>
-            </a:br>
-            <a:r>
-              <a:rPr kumimoji="0" lang="en-US" sz="700" b="1" i="0" u="none" strike="noStrike" kern="1200" cap="none" spc="0" normalizeH="0" baseline="0" noProof="0" dirty="0" smtClean="0">
-                <a:ln>
-                  <a:noFill/>
-                </a:ln>
-                <a:solidFill>
-                  <a:schemeClr val="tx1"/>
-                </a:solidFill>
-                <a:effectLst/>
-                <a:uLnTx/>
-                <a:uFillTx/>
-                <a:latin typeface="Courier" pitchFamily="49" charset="0"/>
-                <a:ea typeface="+mn-ea"/>
-                <a:cs typeface="+mn-cs"/>
-              </a:rPr>
-              <a:t>      &lt;/</a:t>
-            </a:r>
-            <a:r>
-              <a:rPr kumimoji="0" lang="en-US" sz="700" b="1" i="0" u="none" strike="noStrike" kern="1200" cap="none" spc="0" normalizeH="0" baseline="0" noProof="0" dirty="0" err="1" smtClean="0">
-                <a:ln>
-                  <a:noFill/>
-                </a:ln>
-                <a:solidFill>
-                  <a:schemeClr val="tx1"/>
-                </a:solidFill>
-                <a:effectLst/>
-                <a:uLnTx/>
-                <a:uFillTx/>
-                <a:latin typeface="Courier" pitchFamily="49" charset="0"/>
-                <a:ea typeface="+mn-ea"/>
-                <a:cs typeface="+mn-cs"/>
-              </a:rPr>
-              <a:t>NWire</a:t>
-            </a:r>
-            <a:r>
-              <a:rPr kumimoji="0" lang="en-US" sz="700" b="1" i="0" u="none" strike="noStrike" kern="1200" cap="none" spc="0" normalizeH="0" baseline="0" noProof="0" dirty="0" smtClean="0">
-                <a:ln>
-                  <a:noFill/>
-                </a:ln>
-                <a:solidFill>
-                  <a:schemeClr val="tx1"/>
-                </a:solidFill>
-                <a:effectLst/>
-                <a:uLnTx/>
-                <a:uFillTx/>
-                <a:latin typeface="Courier" pitchFamily="49" charset="0"/>
-                <a:ea typeface="+mn-ea"/>
-                <a:cs typeface="+mn-cs"/>
-              </a:rPr>
-              <a:t>&gt;</a:t>
-            </a:r>
-            <a:br>
-              <a:rPr kumimoji="0" lang="en-US" sz="700" b="1" i="0" u="none" strike="noStrike" kern="1200" cap="none" spc="0" normalizeH="0" baseline="0" noProof="0" dirty="0" smtClean="0">
-                <a:ln>
-                  <a:noFill/>
-                </a:ln>
-                <a:solidFill>
-                  <a:schemeClr val="tx1"/>
-                </a:solidFill>
-                <a:effectLst/>
-                <a:uLnTx/>
-                <a:uFillTx/>
-                <a:latin typeface="Courier" pitchFamily="49" charset="0"/>
-                <a:ea typeface="+mn-ea"/>
-                <a:cs typeface="+mn-cs"/>
-              </a:rPr>
-            </a:br>
-            <a:r>
-              <a:rPr kumimoji="0" lang="en-US" sz="700" b="1" i="0" u="none" strike="noStrike" kern="1200" cap="none" spc="0" normalizeH="0" baseline="0" noProof="0" dirty="0" smtClean="0">
-                <a:ln>
-                  <a:noFill/>
-                </a:ln>
-                <a:solidFill>
-                  <a:schemeClr val="tx1"/>
-                </a:solidFill>
-                <a:effectLst/>
-                <a:uLnTx/>
-                <a:uFillTx/>
-                <a:latin typeface="Courier" pitchFamily="49" charset="0"/>
-                <a:ea typeface="+mn-ea"/>
-                <a:cs typeface="+mn-cs"/>
-              </a:rPr>
-              <a:t>      &lt;</a:t>
-            </a:r>
-            <a:r>
-              <a:rPr kumimoji="0" lang="en-US" sz="700" b="1" i="0" u="none" strike="noStrike" kern="1200" cap="none" spc="0" normalizeH="0" baseline="0" noProof="0" dirty="0" err="1" smtClean="0">
-                <a:ln>
-                  <a:noFill/>
-                </a:ln>
-                <a:solidFill>
-                  <a:schemeClr val="tx1"/>
-                </a:solidFill>
-                <a:effectLst/>
-                <a:uLnTx/>
-                <a:uFillTx/>
-                <a:latin typeface="Courier" pitchFamily="49" charset="0"/>
-                <a:ea typeface="+mn-ea"/>
-                <a:cs typeface="+mn-cs"/>
-              </a:rPr>
-              <a:t>NWire</a:t>
-            </a:r>
-            <a:r>
-              <a:rPr kumimoji="0" lang="en-US" sz="700" b="1" i="0" u="none" strike="noStrike" kern="1200" cap="none" spc="0" normalizeH="0" baseline="0" noProof="0" dirty="0" smtClean="0">
-                <a:ln>
-                  <a:noFill/>
-                </a:ln>
-                <a:solidFill>
-                  <a:schemeClr val="tx1"/>
-                </a:solidFill>
-                <a:effectLst/>
-                <a:uLnTx/>
-                <a:uFillTx/>
-                <a:latin typeface="Courier" pitchFamily="49" charset="0"/>
-                <a:ea typeface="+mn-ea"/>
-                <a:cs typeface="+mn-cs"/>
-              </a:rPr>
-              <a:t>&gt;</a:t>
-            </a:r>
-            <a:br>
-              <a:rPr kumimoji="0" lang="en-US" sz="700" b="1" i="0" u="none" strike="noStrike" kern="1200" cap="none" spc="0" normalizeH="0" baseline="0" noProof="0" dirty="0" smtClean="0">
-                <a:ln>
-                  <a:noFill/>
-                </a:ln>
-                <a:solidFill>
-                  <a:schemeClr val="tx1"/>
-                </a:solidFill>
-                <a:effectLst/>
-                <a:uLnTx/>
-                <a:uFillTx/>
-                <a:latin typeface="Courier" pitchFamily="49" charset="0"/>
-                <a:ea typeface="+mn-ea"/>
-                <a:cs typeface="+mn-cs"/>
-              </a:rPr>
-            </a:br>
-            <a:r>
-              <a:rPr kumimoji="0" lang="en-US" sz="700" b="1" i="0" u="none" strike="noStrike" kern="1200" cap="none" spc="0" normalizeH="0" baseline="0" noProof="0" dirty="0" smtClean="0">
-                <a:ln>
-                  <a:noFill/>
-                </a:ln>
-                <a:solidFill>
-                  <a:schemeClr val="tx1"/>
-                </a:solidFill>
-                <a:effectLst/>
-                <a:uLnTx/>
-                <a:uFillTx/>
-                <a:latin typeface="Courier" pitchFamily="49" charset="0"/>
-                <a:ea typeface="+mn-ea"/>
-                <a:cs typeface="+mn-cs"/>
-              </a:rPr>
-              <a:t>        &lt;Wire Id="4" Name="E4_e4" </a:t>
-            </a:r>
-            <a:r>
-              <a:rPr kumimoji="0" lang="en-US" sz="700" b="1" i="0" u="none" strike="noStrike" kern="1200" cap="none" spc="0" normalizeH="0" baseline="0" noProof="0" dirty="0" err="1" smtClean="0">
-                <a:ln>
-                  <a:noFill/>
-                </a:ln>
-                <a:solidFill>
-                  <a:schemeClr val="tx1"/>
-                </a:solidFill>
-                <a:effectLst/>
-                <a:uLnTx/>
-                <a:uFillTx/>
-                <a:latin typeface="Courier" pitchFamily="49" charset="0"/>
-                <a:ea typeface="+mn-ea"/>
-                <a:cs typeface="+mn-cs"/>
-              </a:rPr>
-              <a:t>EndPointFront</a:t>
-            </a:r>
-            <a:r>
-              <a:rPr kumimoji="0" lang="en-US" sz="700" b="1" i="0" u="none" strike="noStrike" kern="1200" cap="none" spc="0" normalizeH="0" baseline="0" noProof="0" dirty="0" smtClean="0">
-                <a:ln>
-                  <a:noFill/>
-                </a:ln>
-                <a:solidFill>
-                  <a:schemeClr val="tx1"/>
-                </a:solidFill>
-                <a:effectLst/>
-                <a:uLnTx/>
-                <a:uFillTx/>
-                <a:latin typeface="Courier" pitchFamily="49" charset="0"/>
-                <a:ea typeface="+mn-ea"/>
-                <a:cs typeface="+mn-cs"/>
-              </a:rPr>
-              <a:t>="</a:t>
-            </a:r>
-            <a:r>
-              <a:rPr kumimoji="0" lang="en-US" sz="700" b="1" i="0" u="none" strike="noStrike" kern="1200" cap="none" spc="0" normalizeH="0" baseline="0" noProof="0" dirty="0" smtClean="0">
-                <a:ln>
-                  <a:noFill/>
-                </a:ln>
-                <a:solidFill>
-                  <a:srgbClr val="0070C0"/>
-                </a:solidFill>
-                <a:effectLst/>
-                <a:uLnTx/>
-                <a:uFillTx/>
-                <a:latin typeface="Courier" pitchFamily="49" charset="0"/>
-                <a:ea typeface="+mn-ea"/>
-                <a:cs typeface="+mn-cs"/>
-              </a:rPr>
-              <a:t>20.0 0.0 0.0</a:t>
-            </a:r>
-            <a:r>
-              <a:rPr kumimoji="0" lang="en-US" sz="700" b="1" i="0" u="none" strike="noStrike" kern="1200" cap="none" spc="0" normalizeH="0" baseline="0" noProof="0" dirty="0" smtClean="0">
-                <a:ln>
-                  <a:noFill/>
-                </a:ln>
-                <a:solidFill>
-                  <a:schemeClr val="tx1"/>
-                </a:solidFill>
-                <a:effectLst/>
-                <a:uLnTx/>
-                <a:uFillTx/>
-                <a:latin typeface="Courier" pitchFamily="49" charset="0"/>
-                <a:ea typeface="+mn-ea"/>
-                <a:cs typeface="+mn-cs"/>
-              </a:rPr>
-              <a:t>" </a:t>
-            </a:r>
-            <a:r>
-              <a:rPr kumimoji="0" lang="en-US" sz="700" b="1" i="0" u="none" strike="noStrike" kern="1200" cap="none" spc="0" normalizeH="0" baseline="0" noProof="0" dirty="0" err="1" smtClean="0">
-                <a:ln>
-                  <a:noFill/>
-                </a:ln>
-                <a:solidFill>
-                  <a:schemeClr val="tx1"/>
-                </a:solidFill>
-                <a:effectLst/>
-                <a:uLnTx/>
-                <a:uFillTx/>
-                <a:latin typeface="Courier" pitchFamily="49" charset="0"/>
-                <a:ea typeface="+mn-ea"/>
-                <a:cs typeface="+mn-cs"/>
-              </a:rPr>
-              <a:t>EndPointBack</a:t>
-            </a:r>
-            <a:r>
-              <a:rPr kumimoji="0" lang="en-US" sz="700" b="1" i="0" u="none" strike="noStrike" kern="1200" cap="none" spc="0" normalizeH="0" baseline="0" noProof="0" dirty="0" smtClean="0">
-                <a:ln>
-                  <a:noFill/>
-                </a:ln>
-                <a:solidFill>
-                  <a:schemeClr val="tx1"/>
-                </a:solidFill>
-                <a:effectLst/>
-                <a:uLnTx/>
-                <a:uFillTx/>
-                <a:latin typeface="Courier" pitchFamily="49" charset="0"/>
-                <a:ea typeface="+mn-ea"/>
-                <a:cs typeface="+mn-cs"/>
-              </a:rPr>
-              <a:t>="</a:t>
-            </a:r>
-            <a:r>
-              <a:rPr kumimoji="0" lang="en-US" sz="700" b="1" i="0" u="none" strike="noStrike" kern="1200" cap="none" spc="0" normalizeH="0" baseline="0" noProof="0" dirty="0" smtClean="0">
-                <a:ln>
-                  <a:noFill/>
-                </a:ln>
-                <a:solidFill>
-                  <a:srgbClr val="0070C0"/>
-                </a:solidFill>
-                <a:effectLst/>
-                <a:uLnTx/>
-                <a:uFillTx/>
-                <a:latin typeface="Courier" pitchFamily="49" charset="0"/>
-                <a:ea typeface="+mn-ea"/>
-                <a:cs typeface="+mn-cs"/>
-              </a:rPr>
-              <a:t>20.0 40.0 0.0</a:t>
-            </a:r>
-            <a:r>
-              <a:rPr kumimoji="0" lang="en-US" sz="700" b="1" i="0" u="none" strike="noStrike" kern="1200" cap="none" spc="0" normalizeH="0" baseline="0" noProof="0" dirty="0" smtClean="0">
-                <a:ln>
-                  <a:noFill/>
-                </a:ln>
-                <a:solidFill>
-                  <a:schemeClr val="tx1"/>
-                </a:solidFill>
-                <a:effectLst/>
-                <a:uLnTx/>
-                <a:uFillTx/>
-                <a:latin typeface="Courier" pitchFamily="49" charset="0"/>
-                <a:ea typeface="+mn-ea"/>
-                <a:cs typeface="+mn-cs"/>
-              </a:rPr>
-              <a:t>" /&gt;</a:t>
-            </a:r>
-            <a:br>
-              <a:rPr kumimoji="0" lang="en-US" sz="700" b="1" i="0" u="none" strike="noStrike" kern="1200" cap="none" spc="0" normalizeH="0" baseline="0" noProof="0" dirty="0" smtClean="0">
-                <a:ln>
-                  <a:noFill/>
-                </a:ln>
-                <a:solidFill>
-                  <a:schemeClr val="tx1"/>
-                </a:solidFill>
-                <a:effectLst/>
-                <a:uLnTx/>
-                <a:uFillTx/>
-                <a:latin typeface="Courier" pitchFamily="49" charset="0"/>
-                <a:ea typeface="+mn-ea"/>
-                <a:cs typeface="+mn-cs"/>
-              </a:rPr>
-            </a:br>
-            <a:r>
-              <a:rPr kumimoji="0" lang="en-US" sz="700" b="1" i="0" u="none" strike="noStrike" kern="1200" cap="none" spc="0" normalizeH="0" baseline="0" noProof="0" dirty="0" smtClean="0">
-                <a:ln>
-                  <a:noFill/>
-                </a:ln>
-                <a:solidFill>
-                  <a:schemeClr val="tx1"/>
-                </a:solidFill>
-                <a:effectLst/>
-                <a:uLnTx/>
-                <a:uFillTx/>
-                <a:latin typeface="Courier" pitchFamily="49" charset="0"/>
-                <a:ea typeface="+mn-ea"/>
-                <a:cs typeface="+mn-cs"/>
-              </a:rPr>
-              <a:t>        &lt;Wire Id="5" Name="J4_f4" </a:t>
-            </a:r>
-            <a:r>
-              <a:rPr kumimoji="0" lang="en-US" sz="700" b="1" i="0" u="none" strike="noStrike" kern="1200" cap="none" spc="0" normalizeH="0" baseline="0" noProof="0" dirty="0" err="1" smtClean="0">
-                <a:ln>
-                  <a:noFill/>
-                </a:ln>
-                <a:solidFill>
-                  <a:schemeClr val="tx1"/>
-                </a:solidFill>
-                <a:effectLst/>
-                <a:uLnTx/>
-                <a:uFillTx/>
-                <a:latin typeface="Courier" pitchFamily="49" charset="0"/>
-                <a:ea typeface="+mn-ea"/>
-                <a:cs typeface="+mn-cs"/>
-              </a:rPr>
-              <a:t>EndPointFront</a:t>
-            </a:r>
-            <a:r>
-              <a:rPr kumimoji="0" lang="en-US" sz="700" b="1" i="0" u="none" strike="noStrike" kern="1200" cap="none" spc="0" normalizeH="0" baseline="0" noProof="0" dirty="0" smtClean="0">
-                <a:ln>
-                  <a:noFill/>
-                </a:ln>
-                <a:solidFill>
-                  <a:schemeClr val="tx1"/>
-                </a:solidFill>
-                <a:effectLst/>
-                <a:uLnTx/>
-                <a:uFillTx/>
-                <a:latin typeface="Courier" pitchFamily="49" charset="0"/>
-                <a:ea typeface="+mn-ea"/>
-                <a:cs typeface="+mn-cs"/>
-              </a:rPr>
-              <a:t>="</a:t>
-            </a:r>
-            <a:r>
-              <a:rPr kumimoji="0" lang="en-US" sz="700" b="1" i="0" u="none" strike="noStrike" kern="1200" cap="none" spc="0" normalizeH="0" baseline="0" noProof="0" dirty="0" smtClean="0">
-                <a:ln>
-                  <a:noFill/>
-                </a:ln>
-                <a:solidFill>
-                  <a:srgbClr val="0070C0"/>
-                </a:solidFill>
-                <a:effectLst/>
-                <a:uLnTx/>
-                <a:uFillTx/>
-                <a:latin typeface="Courier" pitchFamily="49" charset="0"/>
-                <a:ea typeface="+mn-ea"/>
-                <a:cs typeface="+mn-cs"/>
-              </a:rPr>
-              <a:t>45.0 0.0 0.0</a:t>
-            </a:r>
-            <a:r>
-              <a:rPr kumimoji="0" lang="en-US" sz="700" b="1" i="0" u="none" strike="noStrike" kern="1200" cap="none" spc="0" normalizeH="0" baseline="0" noProof="0" dirty="0" smtClean="0">
-                <a:ln>
-                  <a:noFill/>
-                </a:ln>
-                <a:solidFill>
-                  <a:schemeClr val="tx1"/>
-                </a:solidFill>
-                <a:effectLst/>
-                <a:uLnTx/>
-                <a:uFillTx/>
-                <a:latin typeface="Courier" pitchFamily="49" charset="0"/>
-                <a:ea typeface="+mn-ea"/>
-                <a:cs typeface="+mn-cs"/>
-              </a:rPr>
-              <a:t>" </a:t>
-            </a:r>
-            <a:r>
-              <a:rPr kumimoji="0" lang="en-US" sz="700" b="1" i="0" u="none" strike="noStrike" kern="1200" cap="none" spc="0" normalizeH="0" baseline="0" noProof="0" dirty="0" err="1" smtClean="0">
-                <a:ln>
-                  <a:noFill/>
-                </a:ln>
-                <a:solidFill>
-                  <a:schemeClr val="tx1"/>
-                </a:solidFill>
-                <a:effectLst/>
-                <a:uLnTx/>
-                <a:uFillTx/>
-                <a:latin typeface="Courier" pitchFamily="49" charset="0"/>
-                <a:ea typeface="+mn-ea"/>
-                <a:cs typeface="+mn-cs"/>
-              </a:rPr>
-              <a:t>EndPointBack</a:t>
-            </a:r>
-            <a:r>
-              <a:rPr kumimoji="0" lang="en-US" sz="700" b="1" i="0" u="none" strike="noStrike" kern="1200" cap="none" spc="0" normalizeH="0" baseline="0" noProof="0" dirty="0" smtClean="0">
-                <a:ln>
-                  <a:noFill/>
-                </a:ln>
-                <a:solidFill>
-                  <a:schemeClr val="tx1"/>
-                </a:solidFill>
-                <a:effectLst/>
-                <a:uLnTx/>
-                <a:uFillTx/>
-                <a:latin typeface="Courier" pitchFamily="49" charset="0"/>
-                <a:ea typeface="+mn-ea"/>
-                <a:cs typeface="+mn-cs"/>
-              </a:rPr>
-              <a:t>="</a:t>
-            </a:r>
-            <a:r>
-              <a:rPr kumimoji="0" lang="en-US" sz="700" b="1" i="0" u="none" strike="noStrike" kern="1200" cap="none" spc="0" normalizeH="0" baseline="0" noProof="0" dirty="0" smtClean="0">
-                <a:ln>
-                  <a:noFill/>
-                </a:ln>
-                <a:solidFill>
-                  <a:srgbClr val="0070C0"/>
-                </a:solidFill>
-                <a:effectLst/>
-                <a:uLnTx/>
-                <a:uFillTx/>
-                <a:latin typeface="Courier" pitchFamily="49" charset="0"/>
-                <a:ea typeface="+mn-ea"/>
-                <a:cs typeface="+mn-cs"/>
-              </a:rPr>
-              <a:t>25.0 40.0 0.0</a:t>
-            </a:r>
-            <a:r>
-              <a:rPr kumimoji="0" lang="en-US" sz="700" b="1" i="0" u="none" strike="noStrike" kern="1200" cap="none" spc="0" normalizeH="0" baseline="0" noProof="0" dirty="0" smtClean="0">
-                <a:ln>
-                  <a:noFill/>
-                </a:ln>
-                <a:solidFill>
-                  <a:schemeClr val="tx1"/>
-                </a:solidFill>
-                <a:effectLst/>
-                <a:uLnTx/>
-                <a:uFillTx/>
-                <a:latin typeface="Courier" pitchFamily="49" charset="0"/>
-                <a:ea typeface="+mn-ea"/>
-                <a:cs typeface="+mn-cs"/>
-              </a:rPr>
-              <a:t>" /&gt;</a:t>
-            </a:r>
-            <a:br>
-              <a:rPr kumimoji="0" lang="en-US" sz="700" b="1" i="0" u="none" strike="noStrike" kern="1200" cap="none" spc="0" normalizeH="0" baseline="0" noProof="0" dirty="0" smtClean="0">
-                <a:ln>
-                  <a:noFill/>
-                </a:ln>
-                <a:solidFill>
-                  <a:schemeClr val="tx1"/>
-                </a:solidFill>
-                <a:effectLst/>
-                <a:uLnTx/>
-                <a:uFillTx/>
-                <a:latin typeface="Courier" pitchFamily="49" charset="0"/>
-                <a:ea typeface="+mn-ea"/>
-                <a:cs typeface="+mn-cs"/>
-              </a:rPr>
-            </a:br>
-            <a:r>
-              <a:rPr kumimoji="0" lang="en-US" sz="700" b="1" i="0" u="none" strike="noStrike" kern="1200" cap="none" spc="0" normalizeH="0" baseline="0" noProof="0" dirty="0" smtClean="0">
-                <a:ln>
-                  <a:noFill/>
-                </a:ln>
-                <a:solidFill>
-                  <a:schemeClr val="tx1"/>
-                </a:solidFill>
-                <a:effectLst/>
-                <a:uLnTx/>
-                <a:uFillTx/>
-                <a:latin typeface="Courier" pitchFamily="49" charset="0"/>
-                <a:ea typeface="+mn-ea"/>
-                <a:cs typeface="+mn-cs"/>
-              </a:rPr>
-              <a:t>        &lt;Wire Id="6" Name="K4_k4" </a:t>
-            </a:r>
-            <a:r>
-              <a:rPr kumimoji="0" lang="en-US" sz="700" b="1" i="0" u="none" strike="noStrike" kern="1200" cap="none" spc="0" normalizeH="0" baseline="0" noProof="0" dirty="0" err="1" smtClean="0">
-                <a:ln>
-                  <a:noFill/>
-                </a:ln>
-                <a:solidFill>
-                  <a:schemeClr val="tx1"/>
-                </a:solidFill>
-                <a:effectLst/>
-                <a:uLnTx/>
-                <a:uFillTx/>
-                <a:latin typeface="Courier" pitchFamily="49" charset="0"/>
-                <a:ea typeface="+mn-ea"/>
-                <a:cs typeface="+mn-cs"/>
-              </a:rPr>
-              <a:t>EndPointFront</a:t>
-            </a:r>
-            <a:r>
-              <a:rPr kumimoji="0" lang="en-US" sz="700" b="1" i="0" u="none" strike="noStrike" kern="1200" cap="none" spc="0" normalizeH="0" baseline="0" noProof="0" dirty="0" smtClean="0">
-                <a:ln>
-                  <a:noFill/>
-                </a:ln>
-                <a:solidFill>
-                  <a:schemeClr val="tx1"/>
-                </a:solidFill>
-                <a:effectLst/>
-                <a:uLnTx/>
-                <a:uFillTx/>
-                <a:latin typeface="Courier" pitchFamily="49" charset="0"/>
-                <a:ea typeface="+mn-ea"/>
-                <a:cs typeface="+mn-cs"/>
-              </a:rPr>
-              <a:t>="</a:t>
-            </a:r>
-            <a:r>
-              <a:rPr kumimoji="0" lang="en-US" sz="700" b="1" i="0" u="none" strike="noStrike" kern="1200" cap="none" spc="0" normalizeH="0" baseline="0" noProof="0" dirty="0" smtClean="0">
-                <a:ln>
-                  <a:noFill/>
-                </a:ln>
-                <a:solidFill>
-                  <a:srgbClr val="0070C0"/>
-                </a:solidFill>
-                <a:effectLst/>
-                <a:uLnTx/>
-                <a:uFillTx/>
-                <a:latin typeface="Courier" pitchFamily="49" charset="0"/>
-                <a:ea typeface="+mn-ea"/>
-                <a:cs typeface="+mn-cs"/>
-              </a:rPr>
-              <a:t>50.0 0.0 0.0</a:t>
-            </a:r>
-            <a:r>
-              <a:rPr kumimoji="0" lang="en-US" sz="700" b="1" i="0" u="none" strike="noStrike" kern="1200" cap="none" spc="0" normalizeH="0" baseline="0" noProof="0" dirty="0" smtClean="0">
-                <a:ln>
-                  <a:noFill/>
-                </a:ln>
-                <a:solidFill>
-                  <a:schemeClr val="tx1"/>
-                </a:solidFill>
-                <a:effectLst/>
-                <a:uLnTx/>
-                <a:uFillTx/>
-                <a:latin typeface="Courier" pitchFamily="49" charset="0"/>
-                <a:ea typeface="+mn-ea"/>
-                <a:cs typeface="+mn-cs"/>
-              </a:rPr>
-              <a:t>" </a:t>
-            </a:r>
-            <a:r>
-              <a:rPr kumimoji="0" lang="en-US" sz="700" b="1" i="0" u="none" strike="noStrike" kern="1200" cap="none" spc="0" normalizeH="0" baseline="0" noProof="0" dirty="0" err="1" smtClean="0">
-                <a:ln>
-                  <a:noFill/>
-                </a:ln>
-                <a:solidFill>
-                  <a:schemeClr val="tx1"/>
-                </a:solidFill>
-                <a:effectLst/>
-                <a:uLnTx/>
-                <a:uFillTx/>
-                <a:latin typeface="Courier" pitchFamily="49" charset="0"/>
-                <a:ea typeface="+mn-ea"/>
-                <a:cs typeface="+mn-cs"/>
-              </a:rPr>
-              <a:t>EndPointBack</a:t>
-            </a:r>
-            <a:r>
-              <a:rPr kumimoji="0" lang="en-US" sz="700" b="1" i="0" u="none" strike="noStrike" kern="1200" cap="none" spc="0" normalizeH="0" baseline="0" noProof="0" dirty="0" smtClean="0">
-                <a:ln>
-                  <a:noFill/>
-                </a:ln>
-                <a:solidFill>
-                  <a:schemeClr val="tx1"/>
-                </a:solidFill>
-                <a:effectLst/>
-                <a:uLnTx/>
-                <a:uFillTx/>
-                <a:latin typeface="Courier" pitchFamily="49" charset="0"/>
-                <a:ea typeface="+mn-ea"/>
-                <a:cs typeface="+mn-cs"/>
-              </a:rPr>
-              <a:t>="</a:t>
-            </a:r>
-            <a:r>
-              <a:rPr kumimoji="0" lang="en-US" sz="700" b="1" i="0" u="none" strike="noStrike" kern="1200" cap="none" spc="0" normalizeH="0" baseline="0" noProof="0" dirty="0" smtClean="0">
-                <a:ln>
-                  <a:noFill/>
-                </a:ln>
-                <a:solidFill>
-                  <a:srgbClr val="0070C0"/>
-                </a:solidFill>
-                <a:effectLst/>
-                <a:uLnTx/>
-                <a:uFillTx/>
-                <a:latin typeface="Courier" pitchFamily="49" charset="0"/>
-                <a:ea typeface="+mn-ea"/>
-                <a:cs typeface="+mn-cs"/>
-              </a:rPr>
-              <a:t>50.0 40.0 0.0</a:t>
-            </a:r>
-            <a:r>
-              <a:rPr kumimoji="0" lang="en-US" sz="700" b="1" i="0" u="none" strike="noStrike" kern="1200" cap="none" spc="0" normalizeH="0" baseline="0" noProof="0" dirty="0" smtClean="0">
-                <a:ln>
-                  <a:noFill/>
-                </a:ln>
-                <a:solidFill>
-                  <a:schemeClr val="tx1"/>
-                </a:solidFill>
-                <a:effectLst/>
-                <a:uLnTx/>
-                <a:uFillTx/>
-                <a:latin typeface="Courier" pitchFamily="49" charset="0"/>
-                <a:ea typeface="+mn-ea"/>
-                <a:cs typeface="+mn-cs"/>
-              </a:rPr>
-              <a:t>" /&gt;</a:t>
-            </a:r>
-            <a:br>
-              <a:rPr kumimoji="0" lang="en-US" sz="700" b="1" i="0" u="none" strike="noStrike" kern="1200" cap="none" spc="0" normalizeH="0" baseline="0" noProof="0" dirty="0" smtClean="0">
-                <a:ln>
-                  <a:noFill/>
-                </a:ln>
-                <a:solidFill>
-                  <a:schemeClr val="tx1"/>
-                </a:solidFill>
-                <a:effectLst/>
-                <a:uLnTx/>
-                <a:uFillTx/>
-                <a:latin typeface="Courier" pitchFamily="49" charset="0"/>
-                <a:ea typeface="+mn-ea"/>
-                <a:cs typeface="+mn-cs"/>
-              </a:rPr>
-            </a:br>
-            <a:r>
-              <a:rPr kumimoji="0" lang="en-US" sz="700" b="1" i="0" u="none" strike="noStrike" kern="1200" cap="none" spc="0" normalizeH="0" baseline="0" noProof="0" dirty="0" smtClean="0">
-                <a:ln>
-                  <a:noFill/>
-                </a:ln>
-                <a:solidFill>
-                  <a:schemeClr val="tx1"/>
-                </a:solidFill>
-                <a:effectLst/>
-                <a:uLnTx/>
-                <a:uFillTx/>
-                <a:latin typeface="Courier" pitchFamily="49" charset="0"/>
-                <a:ea typeface="+mn-ea"/>
-                <a:cs typeface="+mn-cs"/>
-              </a:rPr>
-              <a:t>      &lt;/</a:t>
-            </a:r>
-            <a:r>
-              <a:rPr kumimoji="0" lang="en-US" sz="700" b="1" i="0" u="none" strike="noStrike" kern="1200" cap="none" spc="0" normalizeH="0" baseline="0" noProof="0" dirty="0" err="1" smtClean="0">
-                <a:ln>
-                  <a:noFill/>
-                </a:ln>
-                <a:solidFill>
-                  <a:schemeClr val="tx1"/>
-                </a:solidFill>
-                <a:effectLst/>
-                <a:uLnTx/>
-                <a:uFillTx/>
-                <a:latin typeface="Courier" pitchFamily="49" charset="0"/>
-                <a:ea typeface="+mn-ea"/>
-                <a:cs typeface="+mn-cs"/>
-              </a:rPr>
-              <a:t>NWire</a:t>
-            </a:r>
-            <a:r>
-              <a:rPr kumimoji="0" lang="en-US" sz="700" b="1" i="0" u="none" strike="noStrike" kern="1200" cap="none" spc="0" normalizeH="0" baseline="0" noProof="0" dirty="0" smtClean="0">
-                <a:ln>
-                  <a:noFill/>
-                </a:ln>
-                <a:solidFill>
-                  <a:schemeClr val="tx1"/>
-                </a:solidFill>
-                <a:effectLst/>
-                <a:uLnTx/>
-                <a:uFillTx/>
-                <a:latin typeface="Courier" pitchFamily="49" charset="0"/>
-                <a:ea typeface="+mn-ea"/>
-                <a:cs typeface="+mn-cs"/>
-              </a:rPr>
-              <a:t>&gt;</a:t>
-            </a:r>
-          </a:p>
-          <a:p>
-            <a:pPr marL="53975" marR="0" lvl="0" indent="0" algn="l" defTabSz="914400" rtl="0" eaLnBrk="1" fontAlgn="auto" latinLnBrk="0" hangingPunct="1">
-              <a:lnSpc>
-                <a:spcPct val="100000"/>
-              </a:lnSpc>
-              <a:spcBef>
-                <a:spcPct val="20000"/>
-              </a:spcBef>
-              <a:spcAft>
-                <a:spcPts val="0"/>
-              </a:spcAft>
-              <a:buClrTx/>
-              <a:buSzTx/>
-              <a:buFont typeface="Arial" pitchFamily="34" charset="0"/>
-              <a:buNone/>
-              <a:tabLst/>
-              <a:defRPr/>
-            </a:pPr>
-            <a:r>
-              <a:rPr kumimoji="0" lang="en-US" sz="700" b="1" i="0" u="none" strike="noStrike" kern="1200" cap="none" spc="0" normalizeH="0" baseline="0" noProof="0" dirty="0" smtClean="0">
-                <a:ln>
-                  <a:noFill/>
-                </a:ln>
-                <a:solidFill>
-                  <a:schemeClr val="tx1"/>
-                </a:solidFill>
-                <a:effectLst/>
-                <a:uLnTx/>
-                <a:uFillTx/>
-                <a:latin typeface="Courier" pitchFamily="49" charset="0"/>
-                <a:ea typeface="+mn-ea"/>
-                <a:cs typeface="+mn-cs"/>
-              </a:rPr>
-              <a:t>...</a:t>
-            </a:r>
-          </a:p>
-          <a:p>
-            <a:pPr marL="53975" marR="0" lvl="0" indent="0" algn="l" defTabSz="914400" rtl="0" eaLnBrk="1" fontAlgn="auto" latinLnBrk="0" hangingPunct="1">
-              <a:lnSpc>
-                <a:spcPct val="100000"/>
-              </a:lnSpc>
-              <a:spcBef>
-                <a:spcPct val="20000"/>
-              </a:spcBef>
-              <a:spcAft>
-                <a:spcPts val="0"/>
-              </a:spcAft>
-              <a:buClrTx/>
-              <a:buSzTx/>
-              <a:buFont typeface="Arial" pitchFamily="34" charset="0"/>
-              <a:buNone/>
-              <a:tabLst/>
-              <a:defRPr/>
-            </a:pPr>
-            <a:r>
-              <a:rPr kumimoji="0" lang="en-US" sz="700" b="1" i="0" u="none" strike="noStrike" kern="1200" cap="none" spc="0" normalizeH="0" baseline="0" noProof="0" dirty="0" smtClean="0">
-                <a:ln>
-                  <a:noFill/>
-                </a:ln>
-                <a:solidFill>
-                  <a:schemeClr val="tx1"/>
-                </a:solidFill>
-                <a:effectLst/>
-                <a:uLnTx/>
-                <a:uFillTx/>
-                <a:latin typeface="Courier" pitchFamily="49" charset="0"/>
-                <a:ea typeface="+mn-ea"/>
-                <a:cs typeface="+mn-cs"/>
+                <a:latin typeface="Courier New" pitchFamily="49" charset="0"/>
+                <a:cs typeface="Courier New" pitchFamily="49" charset="0"/>
               </a:rPr>
               <a:t>&lt;/Geometry&gt;</a:t>
             </a:r>
@@ -5727,9 +5023,8 @@
               <a:effectLst/>
               <a:uLnTx/>
               <a:uFillTx/>
-              <a:latin typeface="+mn-lt"/>
-              <a:ea typeface="+mn-ea"/>
-              <a:cs typeface="+mn-cs"/>
+              <a:latin typeface="Courier New" pitchFamily="49" charset="0"/>
+              <a:cs typeface="Courier New" pitchFamily="49" charset="0"/>
             </a:endParaRPr>
           </a:p>
         </p:txBody>
@@ -5816,14 +5111,20 @@
             </a:pPr>
             <a:r>
               <a:rPr lang="en-CA" dirty="0" smtClean="0"/>
-              <a:t>Phantom mode: fCal_1.0, Wiring: wiring_1.0</a:t>
-            </a:r>
-          </a:p>
-          <a:p>
-            <a:pPr>
-              <a:buNone/>
-            </a:pPr>
-            <a:endParaRPr lang="en-CA" dirty="0" smtClean="0"/>
+              <a:t>Phantom </a:t>
+            </a:r>
+            <a:r>
+              <a:rPr lang="en-CA" dirty="0" smtClean="0"/>
+              <a:t>model: </a:t>
+            </a:r>
+            <a:r>
+              <a:rPr lang="en-CA" dirty="0" smtClean="0"/>
+              <a:t>fCal_1.0, Wiring: </a:t>
+            </a:r>
+            <a:r>
+              <a:rPr lang="en-CA" dirty="0" smtClean="0"/>
+              <a:t>wiring_1.0</a:t>
+            </a:r>
           </a:p>
         </p:txBody>
       </p:sp>
@@ -7106,7 +6407,7 @@
     </p:spTree>
     <p:extLst>
       <p:ext uri="{BB962C8B-B14F-4D97-AF65-F5344CB8AC3E}">
-        <p14:creationId xmlns:p14="http://schemas.microsoft.com/office/powerpoint/2010/main" val="2239487779"/>
+        <p14:creationId xmlns:p14="http://schemas.microsoft.com/office/powerpoint/2010/main" val="843286459"/>
       </p:ext>
     </p:extLst>
   </p:cSld>
@@ -7145,6 +6446,630 @@
         </p:nvSpPr>
         <p:spPr/>
         <p:txBody>
+          <a:bodyPr>
+            <a:normAutofit/>
+          </a:bodyPr>
+          <a:lstStyle/>
+          <a:p>
+            <a:r>
+              <a:rPr lang="en-CA" dirty="0" smtClean="0"/>
+              <a:t>Calibration phantom revisions</a:t>
+            </a:r>
+            <a:endParaRPr lang="en-CA" dirty="0"/>
+          </a:p>
+        </p:txBody>
+      </p:sp>
+      <p:sp>
+        <p:nvSpPr>
+          <p:cNvPr id="3" name="Content Placeholder 2"/>
+          <p:cNvSpPr>
+            <a:spLocks noGrp="1"/>
+          </p:cNvSpPr>
+          <p:nvPr>
+            <p:ph idx="1"/>
+          </p:nvPr>
+        </p:nvSpPr>
+        <p:spPr>
+          <a:xfrm>
+            <a:off x="457200" y="1295400"/>
+            <a:ext cx="8229600" cy="4830763"/>
+          </a:xfrm>
+        </p:spPr>
+        <p:txBody>
+          <a:bodyPr>
+            <a:normAutofit/>
+          </a:bodyPr>
+          <a:lstStyle/>
+          <a:p>
+            <a:r>
+              <a:rPr lang="en-CA" dirty="0" smtClean="0"/>
+              <a:t>Phantom model: </a:t>
+            </a:r>
+            <a:r>
+              <a:rPr lang="en-CA" dirty="0" smtClean="0"/>
+              <a:t>fCal_1.0, Wiring: </a:t>
+            </a:r>
+            <a:r>
+              <a:rPr lang="en-CA" dirty="0" smtClean="0"/>
+              <a:t>wiring_1.x</a:t>
+            </a:r>
+          </a:p>
+          <a:p>
+            <a:pPr lvl="1"/>
+            <a:r>
+              <a:rPr lang="en-CA" dirty="0" smtClean="0"/>
+              <a:t>obsolete, use </a:t>
+            </a:r>
+            <a:r>
+              <a:rPr lang="en-CA" dirty="0" smtClean="0"/>
+              <a:t>fCal_2.0 instead</a:t>
+            </a:r>
+          </a:p>
+          <a:p>
+            <a:r>
+              <a:rPr lang="en-CA" dirty="0"/>
+              <a:t>Phantom model: </a:t>
+            </a:r>
+            <a:r>
+              <a:rPr lang="en-CA" dirty="0" smtClean="0"/>
+              <a:t>fCal_2.0</a:t>
+            </a:r>
+            <a:r>
+              <a:rPr lang="en-CA" dirty="0"/>
+              <a:t>, Wiring: </a:t>
+            </a:r>
+            <a:r>
+              <a:rPr lang="en-CA" dirty="0" smtClean="0"/>
+              <a:t>wiring_2.0</a:t>
+            </a:r>
+          </a:p>
+          <a:p>
+            <a:pPr lvl="1"/>
+            <a:r>
+              <a:rPr lang="en-CA" dirty="0" smtClean="0"/>
+              <a:t>Recommended calibration phantom for 30-90mm imaging depth</a:t>
+            </a:r>
+          </a:p>
+          <a:p>
+            <a:r>
+              <a:rPr lang="en-CA" dirty="0" smtClean="0"/>
+              <a:t>Phantom model: fCal_3.0</a:t>
+            </a:r>
+          </a:p>
+          <a:p>
+            <a:pPr lvl="1"/>
+            <a:r>
+              <a:rPr lang="en-CA" dirty="0" smtClean="0"/>
+              <a:t>Experimental calibration phantom </a:t>
+            </a:r>
+            <a:br>
+              <a:rPr lang="en-CA" dirty="0" smtClean="0"/>
+            </a:br>
+            <a:r>
+              <a:rPr lang="en-CA" dirty="0" smtClean="0"/>
+              <a:t>for &gt;90mm imaging depth</a:t>
+            </a:r>
+          </a:p>
+          <a:p>
+            <a:endParaRPr lang="en-CA" dirty="0" smtClean="0"/>
+          </a:p>
+        </p:txBody>
+      </p:sp>
+      <p:sp>
+        <p:nvSpPr>
+          <p:cNvPr id="4" name="Footer Placeholder 3"/>
+          <p:cNvSpPr>
+            <a:spLocks noGrp="1"/>
+          </p:cNvSpPr>
+          <p:nvPr>
+            <p:ph type="ftr" sz="quarter" idx="11"/>
+          </p:nvPr>
+        </p:nvSpPr>
+        <p:spPr/>
+        <p:txBody>
+          <a:bodyPr/>
+          <a:lstStyle/>
+          <a:p>
+            <a:r>
+              <a:rPr lang="en-US" smtClean="0"/>
+              <a:t>Laboratory for Percutaneous Surgery (The Perk Lab) – Copyright © Queen’s University, 2011</a:t>
+            </a:r>
+          </a:p>
+          <a:p>
+            <a:endParaRPr lang="en-US" dirty="0"/>
+          </a:p>
+        </p:txBody>
+      </p:sp>
+      <p:pic>
+        <p:nvPicPr>
+          <p:cNvPr id="1026" name="Picture 2"/>
+          <p:cNvPicPr>
+            <a:picLocks noChangeAspect="1" noChangeArrowheads="1"/>
+          </p:cNvPicPr>
+          <p:nvPr/>
+        </p:nvPicPr>
+        <p:blipFill rotWithShape="1">
+          <a:blip r:embed="rId2" cstate="print">
+            <a:extLst>
+              <a:ext uri="{28A0092B-C50C-407E-A947-70E740481C1C}">
+                <a14:useLocalDpi xmlns:a14="http://schemas.microsoft.com/office/drawing/2010/main" val="0"/>
+              </a:ext>
+            </a:extLst>
+          </a:blip>
+          <a:srcRect l="7503" t="17904" r="7962" b="13949"/>
+          <a:stretch/>
+        </p:blipFill>
+        <p:spPr bwMode="auto">
+          <a:xfrm>
+            <a:off x="540488" y="4147936"/>
+            <a:ext cx="4031512" cy="1719464"/>
+          </a:xfrm>
+          <a:prstGeom prst="rect">
+            <a:avLst/>
+          </a:prstGeom>
+          <a:noFill/>
+          <a:ln>
+            <a:noFill/>
+          </a:ln>
+          <a:extLst>
+            <a:ext uri="{909E8E84-426E-40DD-AFC4-6F175D3DCCD1}">
+              <a14:hiddenFill xmlns:a14="http://schemas.microsoft.com/office/drawing/2010/main">
+                <a:solidFill>
+                  <a:schemeClr val="accent1"/>
+                </a:solidFill>
+              </a14:hiddenFill>
+            </a:ext>
+            <a:ext uri="{91240B29-F687-4F45-9708-019B960494DF}">
+              <a14:hiddenLine xmlns:a14="http://schemas.microsoft.com/office/drawing/2010/main" w="9525">
+                <a:solidFill>
+                  <a:schemeClr val="tx1"/>
+                </a:solidFill>
+                <a:miter lim="800000"/>
+                <a:headEnd/>
+                <a:tailEnd/>
+              </a14:hiddenLine>
+            </a:ext>
+          </a:extLst>
+        </p:spPr>
+      </p:pic>
+      <p:pic>
+        <p:nvPicPr>
+          <p:cNvPr id="1027" name="Picture 3"/>
+          <p:cNvPicPr>
+            <a:picLocks noChangeAspect="1" noChangeArrowheads="1"/>
+          </p:cNvPicPr>
+          <p:nvPr/>
+        </p:nvPicPr>
+        <p:blipFill>
+          <a:blip r:embed="rId3">
+            <a:extLst>
+              <a:ext uri="{28A0092B-C50C-407E-A947-70E740481C1C}">
+                <a14:useLocalDpi xmlns:a14="http://schemas.microsoft.com/office/drawing/2010/main" val="0"/>
+              </a:ext>
+            </a:extLst>
+          </a:blip>
+          <a:srcRect/>
+          <a:stretch>
+            <a:fillRect/>
+          </a:stretch>
+        </p:blipFill>
+        <p:spPr bwMode="auto">
+          <a:xfrm>
+            <a:off x="5410200" y="3192486"/>
+            <a:ext cx="3252788" cy="2751114"/>
+          </a:xfrm>
+          <a:prstGeom prst="rect">
+            <a:avLst/>
+          </a:prstGeom>
+          <a:noFill/>
+          <a:ln>
+            <a:noFill/>
+          </a:ln>
+          <a:extLst>
+            <a:ext uri="{909E8E84-426E-40DD-AFC4-6F175D3DCCD1}">
+              <a14:hiddenFill xmlns:a14="http://schemas.microsoft.com/office/drawing/2010/main">
+                <a:solidFill>
+                  <a:schemeClr val="accent1"/>
+                </a:solidFill>
+              </a14:hiddenFill>
+            </a:ext>
+            <a:ext uri="{91240B29-F687-4F45-9708-019B960494DF}">
+              <a14:hiddenLine xmlns:a14="http://schemas.microsoft.com/office/drawing/2010/main" w="9525">
+                <a:solidFill>
+                  <a:schemeClr val="tx1"/>
+                </a:solidFill>
+                <a:miter lim="800000"/>
+                <a:headEnd/>
+                <a:tailEnd/>
+              </a14:hiddenLine>
+            </a:ext>
+          </a:extLst>
+        </p:spPr>
+      </p:pic>
+      <p:sp>
+        <p:nvSpPr>
+          <p:cNvPr id="33" name="Content Placeholder 2"/>
+          <p:cNvSpPr txBox="1">
+            <a:spLocks/>
+          </p:cNvSpPr>
+          <p:nvPr/>
+        </p:nvSpPr>
+        <p:spPr>
+          <a:xfrm>
+            <a:off x="1447800" y="5867400"/>
+            <a:ext cx="1946644" cy="609600"/>
+          </a:xfrm>
+          <a:prstGeom prst="rect">
+            <a:avLst/>
+          </a:prstGeom>
+        </p:spPr>
+        <p:txBody>
+          <a:bodyPr vert="horz" lIns="91440" tIns="45720" rIns="91440" bIns="45720" rtlCol="0">
+            <a:normAutofit/>
+          </a:bodyPr>
+          <a:lstStyle>
+            <a:lvl1pPr marL="342900" indent="-342900" algn="l" defTabSz="914400" rtl="0" eaLnBrk="1" latinLnBrk="0" hangingPunct="1">
+              <a:spcBef>
+                <a:spcPct val="20000"/>
+              </a:spcBef>
+              <a:buFont typeface="Arial" pitchFamily="34" charset="0"/>
+              <a:buChar char="•"/>
+              <a:defRPr sz="2400" kern="1200">
+                <a:solidFill>
+                  <a:schemeClr val="tx1"/>
+                </a:solidFill>
+                <a:latin typeface="+mn-lt"/>
+                <a:ea typeface="+mn-ea"/>
+                <a:cs typeface="+mn-cs"/>
+              </a:defRPr>
+            </a:lvl1pPr>
+            <a:lvl2pPr marL="742950" indent="-285750" algn="l" defTabSz="914400" rtl="0" eaLnBrk="1" latinLnBrk="0" hangingPunct="1">
+              <a:spcBef>
+                <a:spcPct val="20000"/>
+              </a:spcBef>
+              <a:buFont typeface="Arial" pitchFamily="34" charset="0"/>
+              <a:buChar char="–"/>
+              <a:defRPr sz="2000" kern="1200">
+                <a:solidFill>
+                  <a:schemeClr val="tx1"/>
+                </a:solidFill>
+                <a:latin typeface="+mn-lt"/>
+                <a:ea typeface="+mn-ea"/>
+                <a:cs typeface="+mn-cs"/>
+              </a:defRPr>
+            </a:lvl2pPr>
+            <a:lvl3pPr marL="1143000" indent="-228600" algn="l" defTabSz="914400" rtl="0" eaLnBrk="1" latinLnBrk="0" hangingPunct="1">
+              <a:spcBef>
+                <a:spcPct val="20000"/>
+              </a:spcBef>
+              <a:buFont typeface="Arial" pitchFamily="34" charset="0"/>
+              <a:buChar char="•"/>
+              <a:defRPr sz="1800" kern="1200">
+                <a:solidFill>
+                  <a:schemeClr val="tx1"/>
+                </a:solidFill>
+                <a:latin typeface="+mn-lt"/>
+                <a:ea typeface="+mn-ea"/>
+                <a:cs typeface="+mn-cs"/>
+              </a:defRPr>
+            </a:lvl3pPr>
+            <a:lvl4pPr marL="1600200" indent="-228600" algn="l" defTabSz="914400" rtl="0" eaLnBrk="1" latinLnBrk="0" hangingPunct="1">
+              <a:spcBef>
+                <a:spcPct val="20000"/>
+              </a:spcBef>
+              <a:buFont typeface="Arial" pitchFamily="34" charset="0"/>
+              <a:buChar char="–"/>
+              <a:defRPr sz="1600" kern="1200">
+                <a:solidFill>
+                  <a:schemeClr val="tx1"/>
+                </a:solidFill>
+                <a:latin typeface="+mn-lt"/>
+                <a:ea typeface="+mn-ea"/>
+                <a:cs typeface="+mn-cs"/>
+              </a:defRPr>
+            </a:lvl4pPr>
+            <a:lvl5pPr marL="2057400" indent="-228600" algn="l" defTabSz="914400" rtl="0" eaLnBrk="1" latinLnBrk="0" hangingPunct="1">
+              <a:spcBef>
+                <a:spcPct val="20000"/>
+              </a:spcBef>
+              <a:buFont typeface="Arial" pitchFamily="34" charset="0"/>
+              <a:buChar char="»"/>
+              <a:defRPr sz="1600" kern="1200">
+                <a:solidFill>
+                  <a:schemeClr val="tx1"/>
+                </a:solidFill>
+                <a:latin typeface="+mn-lt"/>
+                <a:ea typeface="+mn-ea"/>
+                <a:cs typeface="+mn-cs"/>
+              </a:defRPr>
+            </a:lvl5pPr>
+            <a:lvl6pPr marL="2514600" indent="-228600" algn="l" defTabSz="914400" rtl="0" eaLnBrk="1" latinLnBrk="0" hangingPunct="1">
+              <a:spcBef>
+                <a:spcPct val="20000"/>
+              </a:spcBef>
+              <a:buFont typeface="Arial" pitchFamily="34" charset="0"/>
+              <a:buChar char="•"/>
+              <a:defRPr sz="2000" kern="1200">
+                <a:solidFill>
+                  <a:schemeClr val="tx1"/>
+                </a:solidFill>
+                <a:latin typeface="+mn-lt"/>
+                <a:ea typeface="+mn-ea"/>
+                <a:cs typeface="+mn-cs"/>
+              </a:defRPr>
+            </a:lvl6pPr>
+            <a:lvl7pPr marL="2971800" indent="-228600" algn="l" defTabSz="914400" rtl="0" eaLnBrk="1" latinLnBrk="0" hangingPunct="1">
+              <a:spcBef>
+                <a:spcPct val="20000"/>
+              </a:spcBef>
+              <a:buFont typeface="Arial" pitchFamily="34" charset="0"/>
+              <a:buChar char="•"/>
+              <a:defRPr sz="2000" kern="1200">
+                <a:solidFill>
+                  <a:schemeClr val="tx1"/>
+                </a:solidFill>
+                <a:latin typeface="+mn-lt"/>
+                <a:ea typeface="+mn-ea"/>
+                <a:cs typeface="+mn-cs"/>
+              </a:defRPr>
+            </a:lvl7pPr>
+            <a:lvl8pPr marL="3429000" indent="-228600" algn="l" defTabSz="914400" rtl="0" eaLnBrk="1" latinLnBrk="0" hangingPunct="1">
+              <a:spcBef>
+                <a:spcPct val="20000"/>
+              </a:spcBef>
+              <a:buFont typeface="Arial" pitchFamily="34" charset="0"/>
+              <a:buChar char="•"/>
+              <a:defRPr sz="2000" kern="1200">
+                <a:solidFill>
+                  <a:schemeClr val="tx1"/>
+                </a:solidFill>
+                <a:latin typeface="+mn-lt"/>
+                <a:ea typeface="+mn-ea"/>
+                <a:cs typeface="+mn-cs"/>
+              </a:defRPr>
+            </a:lvl8pPr>
+            <a:lvl9pPr marL="3886200" indent="-228600" algn="l" defTabSz="914400" rtl="0" eaLnBrk="1" latinLnBrk="0" hangingPunct="1">
+              <a:spcBef>
+                <a:spcPct val="20000"/>
+              </a:spcBef>
+              <a:buFont typeface="Arial" pitchFamily="34" charset="0"/>
+              <a:buChar char="•"/>
+              <a:defRPr sz="2000" kern="1200">
+                <a:solidFill>
+                  <a:schemeClr val="tx1"/>
+                </a:solidFill>
+                <a:latin typeface="+mn-lt"/>
+                <a:ea typeface="+mn-ea"/>
+                <a:cs typeface="+mn-cs"/>
+              </a:defRPr>
+            </a:lvl9pPr>
+          </a:lstStyle>
+          <a:p>
+            <a:pPr algn="ctr">
+              <a:buFont typeface="Arial" pitchFamily="34" charset="0"/>
+              <a:buNone/>
+            </a:pPr>
+            <a:r>
+              <a:rPr lang="en-CA" dirty="0" smtClean="0"/>
+              <a:t>fCal_2.0</a:t>
+            </a:r>
+            <a:endParaRPr lang="en-CA" dirty="0" smtClean="0"/>
+          </a:p>
+        </p:txBody>
+      </p:sp>
+      <p:sp>
+        <p:nvSpPr>
+          <p:cNvPr id="34" name="Content Placeholder 2"/>
+          <p:cNvSpPr txBox="1">
+            <a:spLocks/>
+          </p:cNvSpPr>
+          <p:nvPr/>
+        </p:nvSpPr>
+        <p:spPr>
+          <a:xfrm>
+            <a:off x="6054356" y="5867400"/>
+            <a:ext cx="1946644" cy="609600"/>
+          </a:xfrm>
+          <a:prstGeom prst="rect">
+            <a:avLst/>
+          </a:prstGeom>
+        </p:spPr>
+        <p:txBody>
+          <a:bodyPr vert="horz" lIns="91440" tIns="45720" rIns="91440" bIns="45720" rtlCol="0">
+            <a:normAutofit/>
+          </a:bodyPr>
+          <a:lstStyle>
+            <a:lvl1pPr marL="342900" indent="-342900" algn="l" defTabSz="914400" rtl="0" eaLnBrk="1" latinLnBrk="0" hangingPunct="1">
+              <a:spcBef>
+                <a:spcPct val="20000"/>
+              </a:spcBef>
+              <a:buFont typeface="Arial" pitchFamily="34" charset="0"/>
+              <a:buChar char="•"/>
+              <a:defRPr sz="2400" kern="1200">
+                <a:solidFill>
+                  <a:schemeClr val="tx1"/>
+                </a:solidFill>
+                <a:latin typeface="+mn-lt"/>
+                <a:ea typeface="+mn-ea"/>
+                <a:cs typeface="+mn-cs"/>
+              </a:defRPr>
+            </a:lvl1pPr>
+            <a:lvl2pPr marL="742950" indent="-285750" algn="l" defTabSz="914400" rtl="0" eaLnBrk="1" latinLnBrk="0" hangingPunct="1">
+              <a:spcBef>
+                <a:spcPct val="20000"/>
+              </a:spcBef>
+              <a:buFont typeface="Arial" pitchFamily="34" charset="0"/>
+              <a:buChar char="–"/>
+              <a:defRPr sz="2000" kern="1200">
+                <a:solidFill>
+                  <a:schemeClr val="tx1"/>
+                </a:solidFill>
+                <a:latin typeface="+mn-lt"/>
+                <a:ea typeface="+mn-ea"/>
+                <a:cs typeface="+mn-cs"/>
+              </a:defRPr>
+            </a:lvl2pPr>
+            <a:lvl3pPr marL="1143000" indent="-228600" algn="l" defTabSz="914400" rtl="0" eaLnBrk="1" latinLnBrk="0" hangingPunct="1">
+              <a:spcBef>
+                <a:spcPct val="20000"/>
+              </a:spcBef>
+              <a:buFont typeface="Arial" pitchFamily="34" charset="0"/>
+              <a:buChar char="•"/>
+              <a:defRPr sz="1800" kern="1200">
+                <a:solidFill>
+                  <a:schemeClr val="tx1"/>
+                </a:solidFill>
+                <a:latin typeface="+mn-lt"/>
+                <a:ea typeface="+mn-ea"/>
+                <a:cs typeface="+mn-cs"/>
+              </a:defRPr>
+            </a:lvl3pPr>
+            <a:lvl4pPr marL="1600200" indent="-228600" algn="l" defTabSz="914400" rtl="0" eaLnBrk="1" latinLnBrk="0" hangingPunct="1">
+              <a:spcBef>
+                <a:spcPct val="20000"/>
+              </a:spcBef>
+              <a:buFont typeface="Arial" pitchFamily="34" charset="0"/>
+              <a:buChar char="–"/>
+              <a:defRPr sz="1600" kern="1200">
+                <a:solidFill>
+                  <a:schemeClr val="tx1"/>
+                </a:solidFill>
+                <a:latin typeface="+mn-lt"/>
+                <a:ea typeface="+mn-ea"/>
+                <a:cs typeface="+mn-cs"/>
+              </a:defRPr>
+            </a:lvl4pPr>
+            <a:lvl5pPr marL="2057400" indent="-228600" algn="l" defTabSz="914400" rtl="0" eaLnBrk="1" latinLnBrk="0" hangingPunct="1">
+              <a:spcBef>
+                <a:spcPct val="20000"/>
+              </a:spcBef>
+              <a:buFont typeface="Arial" pitchFamily="34" charset="0"/>
+              <a:buChar char="»"/>
+              <a:defRPr sz="1600" kern="1200">
+                <a:solidFill>
+                  <a:schemeClr val="tx1"/>
+                </a:solidFill>
+                <a:latin typeface="+mn-lt"/>
+                <a:ea typeface="+mn-ea"/>
+                <a:cs typeface="+mn-cs"/>
+              </a:defRPr>
+            </a:lvl5pPr>
+            <a:lvl6pPr marL="2514600" indent="-228600" algn="l" defTabSz="914400" rtl="0" eaLnBrk="1" latinLnBrk="0" hangingPunct="1">
+              <a:spcBef>
+                <a:spcPct val="20000"/>
+              </a:spcBef>
+              <a:buFont typeface="Arial" pitchFamily="34" charset="0"/>
+              <a:buChar char="•"/>
+              <a:defRPr sz="2000" kern="1200">
+                <a:solidFill>
+                  <a:schemeClr val="tx1"/>
+                </a:solidFill>
+                <a:latin typeface="+mn-lt"/>
+                <a:ea typeface="+mn-ea"/>
+                <a:cs typeface="+mn-cs"/>
+              </a:defRPr>
+            </a:lvl6pPr>
+            <a:lvl7pPr marL="2971800" indent="-228600" algn="l" defTabSz="914400" rtl="0" eaLnBrk="1" latinLnBrk="0" hangingPunct="1">
+              <a:spcBef>
+                <a:spcPct val="20000"/>
+              </a:spcBef>
+              <a:buFont typeface="Arial" pitchFamily="34" charset="0"/>
+              <a:buChar char="•"/>
+              <a:defRPr sz="2000" kern="1200">
+                <a:solidFill>
+                  <a:schemeClr val="tx1"/>
+                </a:solidFill>
+                <a:latin typeface="+mn-lt"/>
+                <a:ea typeface="+mn-ea"/>
+                <a:cs typeface="+mn-cs"/>
+              </a:defRPr>
+            </a:lvl7pPr>
+            <a:lvl8pPr marL="3429000" indent="-228600" algn="l" defTabSz="914400" rtl="0" eaLnBrk="1" latinLnBrk="0" hangingPunct="1">
+              <a:spcBef>
+                <a:spcPct val="20000"/>
+              </a:spcBef>
+              <a:buFont typeface="Arial" pitchFamily="34" charset="0"/>
+              <a:buChar char="•"/>
+              <a:defRPr sz="2000" kern="1200">
+                <a:solidFill>
+                  <a:schemeClr val="tx1"/>
+                </a:solidFill>
+                <a:latin typeface="+mn-lt"/>
+                <a:ea typeface="+mn-ea"/>
+                <a:cs typeface="+mn-cs"/>
+              </a:defRPr>
+            </a:lvl8pPr>
+            <a:lvl9pPr marL="3886200" indent="-228600" algn="l" defTabSz="914400" rtl="0" eaLnBrk="1" latinLnBrk="0" hangingPunct="1">
+              <a:spcBef>
+                <a:spcPct val="20000"/>
+              </a:spcBef>
+              <a:buFont typeface="Arial" pitchFamily="34" charset="0"/>
+              <a:buChar char="•"/>
+              <a:defRPr sz="2000" kern="1200">
+                <a:solidFill>
+                  <a:schemeClr val="tx1"/>
+                </a:solidFill>
+                <a:latin typeface="+mn-lt"/>
+                <a:ea typeface="+mn-ea"/>
+                <a:cs typeface="+mn-cs"/>
+              </a:defRPr>
+            </a:lvl9pPr>
+          </a:lstStyle>
+          <a:p>
+            <a:pPr algn="ctr">
+              <a:buFont typeface="Arial" pitchFamily="34" charset="0"/>
+              <a:buNone/>
+            </a:pPr>
+            <a:r>
+              <a:rPr lang="en-CA" dirty="0" smtClean="0"/>
+              <a:t>fCal_3.0</a:t>
+            </a:r>
+            <a:endParaRPr lang="en-CA" dirty="0" smtClean="0"/>
+          </a:p>
+        </p:txBody>
+      </p:sp>
+    </p:spTree>
+    <p:extLst>
+      <p:ext uri="{BB962C8B-B14F-4D97-AF65-F5344CB8AC3E}">
+        <p14:creationId xmlns:p14="http://schemas.microsoft.com/office/powerpoint/2010/main" val="2239487779"/>
+      </p:ext>
+    </p:extLst>
+  </p:cSld>
+  <p:clrMapOvr>
+    <a:masterClrMapping/>
+  </p:clrMapOvr>
+</p:sld>
+</file>
+
+<file path=ppt/slides/slide6.xml><?xml version="1.0" encoding="utf-8"?>
+<p:sld xmlns:a="http://schemas.openxmlformats.org/drawingml/2006/main" xmlns:r="http://schemas.openxmlformats.org/officeDocument/2006/relationships" xmlns:p="http://schemas.openxmlformats.org/presentationml/2006/main">
+  <p:cSld>
+    <p:spTree>
+      <p:nvGrpSpPr>
+        <p:cNvPr id="1" name=""/>
+        <p:cNvGrpSpPr/>
+        <p:nvPr/>
+      </p:nvGrpSpPr>
+      <p:grpSpPr>
+        <a:xfrm>
+          <a:off x="0" y="0"/>
+          <a:ext cx="0" cy="0"/>
+          <a:chOff x="0" y="0"/>
+          <a:chExt cx="0" cy="0"/>
+        </a:xfrm>
+      </p:grpSpPr>
+      <p:sp>
+        <p:nvSpPr>
+          <p:cNvPr id="2" name="Title 1"/>
+          <p:cNvSpPr>
+            <a:spLocks noGrp="1"/>
+          </p:cNvSpPr>
+          <p:nvPr>
+            <p:ph type="title"/>
+          </p:nvPr>
+        </p:nvSpPr>
+        <p:spPr/>
+        <p:txBody>
           <a:bodyPr/>
           <a:lstStyle/>
           <a:p>
@@ -7180,7 +7105,23 @@
           <a:p>
             <a:r>
               <a:rPr lang="en-US" dirty="0" smtClean="0"/>
-              <a:t>Line alignment is only an issue for fCal_1 phantoms. Slanted holes in fCal_2 and later phantoms take care of line alignment within a hole.</a:t>
+              <a:t>Line alignment is only an issue for </a:t>
+            </a:r>
+            <a:r>
+              <a:rPr lang="en-US" dirty="0" smtClean="0"/>
+              <a:t>fCal_1.x </a:t>
+            </a:r>
+            <a:r>
+              <a:rPr lang="en-US" dirty="0" smtClean="0"/>
+              <a:t>phantoms. Slanted holes in </a:t>
+            </a:r>
+            <a:r>
+              <a:rPr lang="en-US" dirty="0" smtClean="0"/>
+              <a:t>fCal_2.x </a:t>
+            </a:r>
+            <a:r>
+              <a:rPr lang="en-US" dirty="0" smtClean="0"/>
+              <a:t>and later phantoms take care of line alignment within a hole.</a:t>
             </a:r>
             <a:endParaRPr lang="en-US" dirty="0"/>
           </a:p>
@@ -8228,7 +8169,7 @@
 </p:sld>
 </file>
 
-<file path=ppt/slides/slide6.xml><?xml version="1.0" encoding="utf-8"?>
+<file path=ppt/slides/slide7.xml><?xml version="1.0" encoding="utf-8"?>
 <p:sld xmlns:a="http://schemas.openxmlformats.org/drawingml/2006/main" xmlns:r="http://schemas.openxmlformats.org/officeDocument/2006/relationships" xmlns:p="http://schemas.openxmlformats.org/presentationml/2006/main">
   <p:cSld>
     <p:spTree>

</xml_diff>

<commit_message>
re #712: Added more recommendations to fCal phantom printing
git-svn-id: https://subversion.assembla.com/svn/plus/trunk/doc@3131 c04e96f8-ac36-4ff2-8b34-4a5e34ef045f
</commit_message>
<xml_diff>
--- a/tutorials/PlusTutorialBuildingfCalPhantom.pptx
+++ b/tutorials/PlusTutorialBuildingfCalPhantom.pptx
@@ -201,7 +201,7 @@
             <a:fld id="{08AE2C8F-80C9-49EC-8D3E-1E16295FA588}" type="datetimeFigureOut">
               <a:rPr lang="en-US" smtClean="0"/>
               <a:pPr/>
-              <a:t>5/16/2013</a:t>
+              <a:t>1/16/2014</a:t>
             </a:fld>
             <a:endParaRPr lang="en-US"/>
           </a:p>
@@ -4256,26 +4256,18 @@
         <p:spPr>
           <a:xfrm>
             <a:off x="457200" y="1066800"/>
-            <a:ext cx="8229600" cy="5105400"/>
+            <a:ext cx="8229600" cy="5181600"/>
           </a:xfrm>
         </p:spPr>
         <p:txBody>
           <a:bodyPr>
-            <a:normAutofit/>
+            <a:normAutofit fontScale="92500" lnSpcReduction="10000"/>
           </a:bodyPr>
           <a:lstStyle/>
           <a:p>
             <a:r>
               <a:rPr lang="en-CA" dirty="0" smtClean="0"/>
-              <a:t>Download the phantom model </a:t>
-            </a:r>
-            <a:r>
-              <a:rPr lang="en-CA" dirty="0" smtClean="0"/>
-              <a:t>in STL format from </a:t>
-            </a:r>
-            <a:r>
-              <a:rPr lang="en-CA" dirty="0" smtClean="0"/>
-              <a:t>the repository:</a:t>
+              <a:t>Download the phantom model in STL format from the repository:</a:t>
             </a:r>
           </a:p>
           <a:p>
@@ -4299,95 +4291,181 @@
           <a:p>
             <a:r>
               <a:rPr lang="en-CA" dirty="0" smtClean="0"/>
-              <a:t>You can have a look at the model if you open it in </a:t>
-            </a:r>
-            <a:r>
-              <a:rPr lang="en-CA" dirty="0" err="1" smtClean="0"/>
+              <a:t>You can have a look at the </a:t>
+            </a:r>
+            <a:r>
+              <a:rPr lang="en-CA" dirty="0" smtClean="0"/>
+              <a:t>model file in </a:t>
+            </a:r>
+            <a:r>
+              <a:rPr lang="en-CA" dirty="0" smtClean="0">
+                <a:hlinkClick r:id="rId3"/>
+              </a:rPr>
+              <a:t>3D Slicer</a:t>
+            </a:r>
+            <a:r>
+              <a:rPr lang="en-CA" dirty="0" smtClean="0"/>
+              <a:t> or </a:t>
+            </a:r>
+            <a:r>
+              <a:rPr lang="en-CA" dirty="0" smtClean="0">
+                <a:hlinkClick r:id="rId4"/>
+              </a:rPr>
               <a:t>Paraview</a:t>
             </a:r>
+            <a:endParaRPr lang="en-CA" dirty="0" smtClean="0"/>
+          </a:p>
+          <a:p>
             <a:r>
               <a:rPr lang="en-CA" dirty="0" smtClean="0"/>
-              <a:t> or 3D Slicer</a:t>
-            </a:r>
-          </a:p>
-          <a:p>
-            <a:r>
-              <a:rPr lang="en-CA" dirty="0" smtClean="0"/>
-              <a:t>Print the STL file using </a:t>
-            </a:r>
-            <a:r>
-              <a:rPr lang="en-CA" dirty="0" smtClean="0"/>
-              <a:t>a regular </a:t>
+              <a:t>Print the STL file using a regular </a:t>
             </a:r>
             <a:br>
               <a:rPr lang="en-CA" dirty="0" smtClean="0"/>
             </a:br>
             <a:r>
               <a:rPr lang="en-CA" dirty="0" smtClean="0"/>
-              <a:t>3D </a:t>
+              <a:t>3D rapid prototyping printer</a:t>
+            </a:r>
+          </a:p>
+          <a:p>
+            <a:pPr lvl="1"/>
+            <a:r>
+              <a:rPr lang="en-CA" dirty="0"/>
+              <a:t>FDM printing of dense ABS </a:t>
             </a:r>
             <a:r>
               <a:rPr lang="en-CA" dirty="0" smtClean="0"/>
-              <a:t>rapid </a:t>
-            </a:r>
-            <a:r>
-              <a:rPr lang="en-CA" dirty="0" smtClean="0"/>
-              <a:t>prototyping printer </a:t>
+              <a:t>plastic</a:t>
             </a:r>
             <a:br>
               <a:rPr lang="en-CA" dirty="0" smtClean="0"/>
             </a:br>
             <a:r>
               <a:rPr lang="en-CA" dirty="0" smtClean="0"/>
-              <a:t>(if you do not know any local</a:t>
+              <a:t>is </a:t>
+            </a:r>
+            <a:r>
+              <a:rPr lang="en-CA" dirty="0"/>
+              <a:t>recommended</a:t>
+            </a:r>
+          </a:p>
+          <a:p>
+            <a:pPr lvl="1"/>
+            <a:r>
+              <a:rPr lang="en-CA" dirty="0"/>
+              <a:t>The cost should be </a:t>
+            </a:r>
+            <a:r>
+              <a:rPr lang="en-CA" dirty="0" smtClean="0"/>
+              <a:t>around $30-$150</a:t>
+            </a:r>
+          </a:p>
+          <a:p>
+            <a:pPr lvl="1">
+              <a:lnSpc>
+                <a:spcPct val="110000"/>
+              </a:lnSpc>
+            </a:pPr>
+            <a:r>
+              <a:rPr lang="en-CA" dirty="0" smtClean="0"/>
+              <a:t>If </a:t>
+            </a:r>
+            <a:r>
+              <a:rPr lang="en-CA" dirty="0"/>
+              <a:t>you do not </a:t>
+            </a:r>
+            <a:r>
+              <a:rPr lang="en-CA" dirty="0" smtClean="0"/>
+              <a:t>have access to a</a:t>
             </a:r>
             <a:br>
               <a:rPr lang="en-CA" dirty="0" smtClean="0"/>
             </a:br>
             <a:r>
               <a:rPr lang="en-CA" dirty="0" smtClean="0"/>
-              <a:t>3D printing company, you can </a:t>
+              <a:t>3D printer know or the local</a:t>
             </a:r>
             <a:br>
               <a:rPr lang="en-CA" dirty="0" smtClean="0"/>
             </a:br>
             <a:r>
               <a:rPr lang="en-CA" dirty="0" smtClean="0"/>
-              <a:t>just send your model to an </a:t>
+              <a:t>3D </a:t>
+            </a:r>
+            <a:r>
+              <a:rPr lang="en-CA" dirty="0"/>
+              <a:t>printing </a:t>
+            </a:r>
+            <a:r>
+              <a:rPr lang="en-CA" dirty="0" smtClean="0"/>
+              <a:t>shops are expensive</a:t>
             </a:r>
             <a:br>
               <a:rPr lang="en-CA" dirty="0" smtClean="0"/>
             </a:br>
             <a:r>
               <a:rPr lang="en-CA" dirty="0" smtClean="0"/>
-              <a:t>on-line 3D printing company: </a:t>
+              <a:t>then </a:t>
+            </a:r>
+            <a:r>
+              <a:rPr lang="en-CA" dirty="0"/>
+              <a:t>you can </a:t>
+            </a:r>
+            <a:r>
+              <a:rPr lang="en-CA" dirty="0" smtClean="0"/>
+              <a:t>just upload </a:t>
+            </a:r>
+            <a:r>
+              <a:rPr lang="en-CA" dirty="0"/>
+              <a:t>your </a:t>
+            </a:r>
+            <a:r>
+              <a:rPr lang="en-CA" dirty="0" smtClean="0"/>
+              <a:t>model</a:t>
             </a:r>
             <a:br>
               <a:rPr lang="en-CA" dirty="0" smtClean="0"/>
             </a:br>
             <a:r>
+              <a:rPr lang="en-CA" dirty="0" smtClean="0"/>
+              <a:t>and get it by post within a couple of days:</a:t>
+            </a:r>
+            <a:br>
+              <a:rPr lang="en-CA" dirty="0" smtClean="0"/>
+            </a:br>
+            <a:r>
+              <a:rPr lang="en-CA" dirty="0" smtClean="0">
+                <a:hlinkClick r:id="rId5"/>
+              </a:rPr>
+              <a:t>http</a:t>
+            </a:r>
+            <a:r>
+              <a:rPr lang="en-CA" dirty="0">
+                <a:hlinkClick r:id="rId5"/>
+              </a:rPr>
+              <a:t>://3dprintingpricecheck.com/</a:t>
+            </a:r>
+            <a:r>
+              <a:rPr lang="en-CA" dirty="0"/>
+              <a:t/>
+            </a:r>
+            <a:br>
+              <a:rPr lang="en-CA" dirty="0"/>
+            </a:br>
+            <a:r>
+              <a:rPr lang="en-US" dirty="0">
+                <a:hlinkClick r:id="rId6"/>
+              </a:rPr>
+              <a:t>http://</a:t>
+            </a:r>
+            <a:r>
               <a:rPr lang="en-US" dirty="0" smtClean="0">
-                <a:hlinkClick r:id="rId3"/>
-              </a:rPr>
-              <a:t>http</a:t>
-            </a:r>
-            <a:r>
-              <a:rPr lang="en-US" dirty="0">
-                <a:hlinkClick r:id="rId3"/>
-              </a:rPr>
-              <a:t>://</a:t>
-            </a:r>
-            <a:r>
-              <a:rPr lang="en-US" dirty="0" smtClean="0">
-                <a:hlinkClick r:id="rId3"/>
+                <a:hlinkClick r:id="rId6"/>
               </a:rPr>
               <a:t>www.3ders.org/3d-printing/3d-print-services.html</a:t>
             </a:r>
-            <a:r>
-              <a:rPr lang="en-US" dirty="0" smtClean="0"/>
-              <a:t>)</a:t>
-            </a:r>
-            <a:endParaRPr lang="en-CA" dirty="0" smtClean="0"/>
+            <a:endParaRPr lang="en-CA" dirty="0"/>
           </a:p>
         </p:txBody>
       </p:sp>
@@ -4425,7 +4503,7 @@
           <p:nvPr/>
         </p:nvPicPr>
         <p:blipFill>
-          <a:blip r:embed="rId4" cstate="print">
+          <a:blip r:embed="rId7" cstate="print">
             <a:extLst>
               <a:ext uri="{28A0092B-C50C-407E-A947-70E740481C1C}">
                 <a14:useLocalDpi xmlns:a14="http://schemas.microsoft.com/office/drawing/2010/main" val="0"/>
@@ -4439,7 +4517,7 @@
         </p:blipFill>
         <p:spPr bwMode="auto">
           <a:xfrm>
-            <a:off x="5029200" y="3020145"/>
+            <a:off x="5029200" y="2743200"/>
             <a:ext cx="3810000" cy="2161455"/>
           </a:xfrm>
           <a:prstGeom prst="rect">
@@ -4556,13 +4634,8 @@
           <a:p>
             <a:r>
               <a:rPr lang="en-CA" sz="1400" dirty="0" smtClean="0"/>
-              <a:t>Fiducial line material: regular fishing </a:t>
-            </a:r>
-            <a:r>
-              <a:rPr lang="en-CA" sz="1400" dirty="0" smtClean="0"/>
-              <a:t>line, about 0.2-0.3 mm diameter</a:t>
-            </a:r>
-            <a:endParaRPr lang="en-CA" sz="1400" dirty="0" smtClean="0"/>
+              <a:t>Fiducial line material: regular fishing line, about 0.2-0.3 mm diameter</a:t>
+            </a:r>
           </a:p>
           <a:p>
             <a:r>
@@ -4623,11 +4696,7 @@
           <a:p>
             <a:r>
               <a:rPr lang="en-CA" sz="1400" dirty="0" smtClean="0"/>
-              <a:t>The </a:t>
-            </a:r>
-            <a:r>
-              <a:rPr lang="en-CA" sz="1400" dirty="0" smtClean="0"/>
-              <a:t>automatic calibration method in </a:t>
+              <a:t>The automatic calibration method in </a:t>
             </a:r>
             <a:r>
               <a:rPr lang="en-CA" sz="1400" dirty="0" err="1" smtClean="0"/>
@@ -4898,7 +4967,19 @@
                 <a:ea typeface="+mn-ea"/>
                 <a:cs typeface="+mn-cs"/>
               </a:rPr>
-              <a:t> coordinate </a:t>
+              <a:t> coordinate system’s origin is the endpoint of the bottom </a:t>
+            </a:r>
+            <a:r>
+              <a:rPr lang="en-US" sz="1400" dirty="0"/>
+              <a:t>left hole (on fCal-2.x it is the A5</a:t>
+            </a:r>
+            <a:r>
+              <a:rPr lang="en-US" sz="1400" dirty="0" smtClean="0"/>
+              <a:t>), </a:t>
+            </a:r>
+            <a:r>
+              <a:rPr lang="en-US" sz="1400" dirty="0"/>
+              <a:t>inside </a:t>
             </a:r>
             <a:r>
               <a:rPr kumimoji="0" lang="en-US" sz="1400" b="0" i="0" u="none" strike="noStrike" kern="1200" cap="none" spc="0" normalizeH="0" baseline="0" noProof="0" dirty="0" smtClean="0">
@@ -4915,8 +4996,16 @@
                 <a:ea typeface="+mn-ea"/>
                 <a:cs typeface="+mn-cs"/>
               </a:rPr>
-              <a:t>system’s </a:t>
-            </a:r>
+              <a:t>the box.</a:t>
+            </a:r>
+          </a:p>
+          <a:p>
+            <a:pPr lvl="0">
+              <a:spcBef>
+                <a:spcPct val="20000"/>
+              </a:spcBef>
+              <a:defRPr/>
+            </a:pPr>
             <a:r>
               <a:rPr kumimoji="0" lang="en-US" sz="1400" b="0" i="0" u="none" strike="noStrike" kern="1200" cap="none" spc="0" normalizeH="0" baseline="0" noProof="0" dirty="0" smtClean="0">
                 <a:ln>
@@ -4932,112 +5021,7 @@
                 <a:ea typeface="+mn-ea"/>
                 <a:cs typeface="+mn-cs"/>
               </a:rPr>
-              <a:t>origin is the endpoint of the </a:t>
-            </a:r>
-            <a:r>
-              <a:rPr kumimoji="0" lang="en-US" sz="1400" b="0" i="0" u="none" strike="noStrike" kern="1200" cap="none" spc="0" normalizeH="0" baseline="0" noProof="0" dirty="0" smtClean="0">
-                <a:ln>
-                  <a:noFill/>
-                </a:ln>
-                <a:solidFill>
-                  <a:schemeClr val="tx1"/>
-                </a:solidFill>
-                <a:effectLst/>
-                <a:uLnTx/>
-                <a:uFillTx/>
-                <a:latin typeface="+mn-lt"/>
-                <a:ea typeface="+mn-ea"/>
-                <a:cs typeface="+mn-cs"/>
-              </a:rPr>
-              <a:t>bottom </a:t>
-            </a:r>
-            <a:r>
-              <a:rPr lang="en-US" sz="1400" dirty="0"/>
-              <a:t>left hole (on fCal-2.x it is the A5</a:t>
-            </a:r>
-            <a:r>
-              <a:rPr lang="en-US" sz="1400" dirty="0" smtClean="0"/>
-              <a:t>), </a:t>
-            </a:r>
-            <a:r>
-              <a:rPr lang="en-US" sz="1400" dirty="0"/>
-              <a:t>inside </a:t>
-            </a:r>
-            <a:r>
-              <a:rPr kumimoji="0" lang="en-US" sz="1400" b="0" i="0" u="none" strike="noStrike" kern="1200" cap="none" spc="0" normalizeH="0" baseline="0" noProof="0" dirty="0" smtClean="0">
-                <a:ln>
-                  <a:noFill/>
-                </a:ln>
-                <a:solidFill>
-                  <a:schemeClr val="tx1"/>
-                </a:solidFill>
-                <a:effectLst/>
-                <a:uLnTx/>
-                <a:uFillTx/>
-                <a:latin typeface="+mn-lt"/>
-                <a:ea typeface="+mn-ea"/>
-                <a:cs typeface="+mn-cs"/>
-              </a:rPr>
-              <a:t>the </a:t>
-            </a:r>
-            <a:r>
-              <a:rPr kumimoji="0" lang="en-US" sz="1400" b="0" i="0" u="none" strike="noStrike" kern="1200" cap="none" spc="0" normalizeH="0" baseline="0" noProof="0" dirty="0" smtClean="0">
-                <a:ln>
-                  <a:noFill/>
-                </a:ln>
-                <a:solidFill>
-                  <a:schemeClr val="tx1"/>
-                </a:solidFill>
-                <a:effectLst/>
-                <a:uLnTx/>
-                <a:uFillTx/>
-                <a:latin typeface="+mn-lt"/>
-                <a:ea typeface="+mn-ea"/>
-                <a:cs typeface="+mn-cs"/>
-              </a:rPr>
-              <a:t>box.</a:t>
-            </a:r>
-          </a:p>
-          <a:p>
-            <a:pPr lvl="0">
-              <a:spcBef>
-                <a:spcPct val="20000"/>
-              </a:spcBef>
-              <a:defRPr/>
-            </a:pPr>
-            <a:r>
-              <a:rPr kumimoji="0" lang="en-US" sz="1400" b="0" i="0" u="none" strike="noStrike" kern="1200" cap="none" spc="0" normalizeH="0" baseline="0" noProof="0" dirty="0" smtClean="0">
-                <a:ln>
-                  <a:noFill/>
-                </a:ln>
-                <a:solidFill>
-                  <a:schemeClr val="tx1"/>
-                </a:solidFill>
-                <a:effectLst/>
-                <a:uLnTx/>
-                <a:uFillTx/>
-                <a:latin typeface="+mn-lt"/>
-                <a:ea typeface="+mn-ea"/>
-                <a:cs typeface="+mn-cs"/>
-              </a:rPr>
-              <a:t>See </a:t>
-            </a:r>
-            <a:r>
-              <a:rPr kumimoji="0" lang="en-US" sz="1400" b="0" i="0" u="none" strike="noStrike" kern="1200" cap="none" spc="0" normalizeH="0" baseline="0" noProof="0" dirty="0" smtClean="0">
-                <a:ln>
-                  <a:noFill/>
-                </a:ln>
-                <a:solidFill>
-                  <a:schemeClr val="tx1"/>
-                </a:solidFill>
-                <a:effectLst/>
-                <a:uLnTx/>
-                <a:uFillTx/>
-                <a:latin typeface="+mn-lt"/>
-                <a:ea typeface="+mn-ea"/>
-                <a:cs typeface="+mn-cs"/>
-              </a:rPr>
-              <a:t>the image on the right or the coordinate system definition model here for more information:</a:t>
+              <a:t>See the image on the right or the coordinate system definition model here for more information:</a:t>
             </a:r>
             <a:br>
               <a:rPr kumimoji="0" lang="en-US" sz="1400" b="0" i="0" u="none" strike="noStrike" kern="1200" cap="none" spc="0" normalizeH="0" baseline="0" noProof="0" dirty="0" smtClean="0">
@@ -5874,11 +5858,7 @@
           <a:p>
             <a:r>
               <a:rPr lang="en-US" dirty="0" smtClean="0"/>
-              <a:t>You can stretch the fiducial lines by using a rubber band as it is shown in the picture </a:t>
-            </a:r>
-            <a:r>
-              <a:rPr lang="en-US" dirty="0" smtClean="0"/>
-              <a:t>below</a:t>
+              <a:t>You can stretch the fiducial lines by using a rubber band as it is shown in the picture below</a:t>
             </a:r>
           </a:p>
           <a:p>
@@ -5890,7 +5870,6 @@
               <a:rPr lang="en-US" dirty="0" smtClean="0"/>
               <a:t>hole.</a:t>
             </a:r>
-            <a:endParaRPr lang="en-US" dirty="0" smtClean="0"/>
           </a:p>
           <a:p>
             <a:endParaRPr lang="en-US" dirty="0" smtClean="0"/>
@@ -6241,13 +6220,8 @@
             <a:pPr lvl="1"/>
             <a:r>
               <a:rPr lang="en-CA" dirty="0" smtClean="0"/>
-              <a:t>obsolete, use </a:t>
-            </a:r>
-            <a:r>
-              <a:rPr lang="en-CA" dirty="0" smtClean="0"/>
-              <a:t>fCal_2.0 instead</a:t>
-            </a:r>
-            <a:endParaRPr lang="en-CA" dirty="0" smtClean="0"/>
+              <a:t>obsolete, use fCal_2.0 instead</a:t>
+            </a:r>
           </a:p>
         </p:txBody>
       </p:sp>
@@ -7532,11 +7506,7 @@
             </a:pPr>
             <a:r>
               <a:rPr lang="en-CA" dirty="0" smtClean="0"/>
-              <a:t>Phantom model: fCal_1.0, Wiring: </a:t>
-            </a:r>
-            <a:r>
-              <a:rPr lang="en-CA" dirty="0" smtClean="0"/>
-              <a:t>wiring_1.0</a:t>
+              <a:t>Phantom model: fCal_1.0, Wiring: wiring_1.0</a:t>
             </a:r>
           </a:p>
         </p:txBody>

</xml_diff>